<commit_message>
updates slide per input from Benoit
</commit_message>
<xml_diff>
--- a/draft-tgraf-opsawg-ipfix-srv6-srh-04.pptx
+++ b/draft-tgraf-opsawg-ipfix-srv6-srh-04.pptx
@@ -5,12 +5,14 @@
     <p:sldMasterId id="2147483648" r:id="rId1"/>
   </p:sldMasterIdLst>
   <p:notesMasterIdLst>
-    <p:notesMasterId r:id="rId5"/>
+    <p:notesMasterId r:id="rId7"/>
   </p:notesMasterIdLst>
   <p:sldIdLst>
     <p:sldId id="1041" r:id="rId2"/>
-    <p:sldId id="1057" r:id="rId3"/>
-    <p:sldId id="1050" r:id="rId4"/>
+    <p:sldId id="1054" r:id="rId3"/>
+    <p:sldId id="1055" r:id="rId4"/>
+    <p:sldId id="1057" r:id="rId5"/>
+    <p:sldId id="1050" r:id="rId6"/>
   </p:sldIdLst>
   <p:sldSz cx="12192000" cy="6858000"/>
   <p:notesSz cx="6858000" cy="9144000"/>
@@ -924,7 +926,7 @@
           <a:p>
             <a:fld id="{E5E705E9-673F-4AC4-B29E-A7B26F3B8523}" type="datetimeFigureOut">
               <a:rPr lang="de-CH" smtClean="0"/>
-              <a:t>16.07.2022</a:t>
+              <a:t>19.07.2022</a:t>
             </a:fld>
             <a:endParaRPr lang="de-CH"/>
           </a:p>
@@ -1341,7 +1343,7 @@
           <a:p>
             <a:fld id="{9E9B238C-2335-4007-98C9-471C02CC43B6}" type="datetimeFigureOut">
               <a:rPr lang="de-CH" smtClean="0"/>
-              <a:t>16.07.2022</a:t>
+              <a:t>19.07.2022</a:t>
             </a:fld>
             <a:endParaRPr lang="de-CH"/>
           </a:p>
@@ -1541,7 +1543,7 @@
           <a:p>
             <a:fld id="{9E9B238C-2335-4007-98C9-471C02CC43B6}" type="datetimeFigureOut">
               <a:rPr lang="de-CH" smtClean="0"/>
-              <a:t>16.07.2022</a:t>
+              <a:t>19.07.2022</a:t>
             </a:fld>
             <a:endParaRPr lang="de-CH"/>
           </a:p>
@@ -1751,7 +1753,7 @@
           <a:p>
             <a:fld id="{9E9B238C-2335-4007-98C9-471C02CC43B6}" type="datetimeFigureOut">
               <a:rPr lang="de-CH" smtClean="0"/>
-              <a:t>16.07.2022</a:t>
+              <a:t>19.07.2022</a:t>
             </a:fld>
             <a:endParaRPr lang="de-CH"/>
           </a:p>
@@ -1951,7 +1953,7 @@
           <a:p>
             <a:fld id="{9E9B238C-2335-4007-98C9-471C02CC43B6}" type="datetimeFigureOut">
               <a:rPr lang="de-CH" smtClean="0"/>
-              <a:t>16.07.2022</a:t>
+              <a:t>19.07.2022</a:t>
             </a:fld>
             <a:endParaRPr lang="de-CH"/>
           </a:p>
@@ -2227,7 +2229,7 @@
           <a:p>
             <a:fld id="{9E9B238C-2335-4007-98C9-471C02CC43B6}" type="datetimeFigureOut">
               <a:rPr lang="de-CH" smtClean="0"/>
-              <a:t>16.07.2022</a:t>
+              <a:t>19.07.2022</a:t>
             </a:fld>
             <a:endParaRPr lang="de-CH"/>
           </a:p>
@@ -2495,7 +2497,7 @@
           <a:p>
             <a:fld id="{9E9B238C-2335-4007-98C9-471C02CC43B6}" type="datetimeFigureOut">
               <a:rPr lang="de-CH" smtClean="0"/>
-              <a:t>16.07.2022</a:t>
+              <a:t>19.07.2022</a:t>
             </a:fld>
             <a:endParaRPr lang="de-CH"/>
           </a:p>
@@ -2910,7 +2912,7 @@
           <a:p>
             <a:fld id="{9E9B238C-2335-4007-98C9-471C02CC43B6}" type="datetimeFigureOut">
               <a:rPr lang="de-CH" smtClean="0"/>
-              <a:t>16.07.2022</a:t>
+              <a:t>19.07.2022</a:t>
             </a:fld>
             <a:endParaRPr lang="de-CH"/>
           </a:p>
@@ -3052,7 +3054,7 @@
           <a:p>
             <a:fld id="{9E9B238C-2335-4007-98C9-471C02CC43B6}" type="datetimeFigureOut">
               <a:rPr lang="de-CH" smtClean="0"/>
-              <a:t>16.07.2022</a:t>
+              <a:t>19.07.2022</a:t>
             </a:fld>
             <a:endParaRPr lang="de-CH"/>
           </a:p>
@@ -3165,7 +3167,7 @@
           <a:p>
             <a:fld id="{9E9B238C-2335-4007-98C9-471C02CC43B6}" type="datetimeFigureOut">
               <a:rPr lang="de-CH" smtClean="0"/>
-              <a:t>16.07.2022</a:t>
+              <a:t>19.07.2022</a:t>
             </a:fld>
             <a:endParaRPr lang="de-CH"/>
           </a:p>
@@ -3478,7 +3480,7 @@
           <a:p>
             <a:fld id="{9E9B238C-2335-4007-98C9-471C02CC43B6}" type="datetimeFigureOut">
               <a:rPr lang="de-CH" smtClean="0"/>
-              <a:t>16.07.2022</a:t>
+              <a:t>19.07.2022</a:t>
             </a:fld>
             <a:endParaRPr lang="de-CH"/>
           </a:p>
@@ -3767,7 +3769,7 @@
           <a:p>
             <a:fld id="{9E9B238C-2335-4007-98C9-471C02CC43B6}" type="datetimeFigureOut">
               <a:rPr lang="de-CH" smtClean="0"/>
-              <a:t>16.07.2022</a:t>
+              <a:t>19.07.2022</a:t>
             </a:fld>
             <a:endParaRPr lang="de-CH"/>
           </a:p>
@@ -4010,7 +4012,7 @@
           <a:p>
             <a:fld id="{9E9B238C-2335-4007-98C9-471C02CC43B6}" type="datetimeFigureOut">
               <a:rPr lang="de-CH" smtClean="0"/>
-              <a:t>16.07.2022</a:t>
+              <a:t>19.07.2022</a:t>
             </a:fld>
             <a:endParaRPr lang="de-CH"/>
           </a:p>
@@ -4875,27 +4877,35 @@
         </p:nvSpPr>
         <p:spPr/>
         <p:txBody>
-          <a:bodyPr>
-            <a:normAutofit/>
-          </a:bodyPr>
+          <a:bodyPr/>
           <a:lstStyle/>
           <a:p>
             <a:r>
-              <a:rPr lang="en-US" sz="3600" b="1"/>
+              <a:rPr lang="en-US" sz="3600" b="1" dirty="0"/>
               <a:t>SRv6 @ IPFIX</a:t>
             </a:r>
             <a:br>
-              <a:rPr lang="en-US" sz="3600"/>
+              <a:rPr lang="en-US" dirty="0"/>
             </a:br>
             <a:r>
-              <a:rPr lang="en-US" sz="3600">
+              <a:rPr lang="en-US" sz="3600" dirty="0" err="1">
                 <a:solidFill>
                   <a:schemeClr val="bg2">
                     <a:lumMod val="75000"/>
                   </a:schemeClr>
                 </a:solidFill>
               </a:rPr>
-              <a:t>Draft Status</a:t>
+              <a:t>IPFIX</a:t>
+            </a:r>
+            <a:r>
+              <a:rPr lang="en-US" sz="3600" dirty="0">
+                <a:solidFill>
+                  <a:schemeClr val="bg2">
+                    <a:lumMod val="75000"/>
+                  </a:schemeClr>
+                </a:solidFill>
+              </a:rPr>
+              <a:t> entities in context of the SRH (1)</a:t>
             </a:r>
           </a:p>
         </p:txBody>
@@ -4918,8 +4928,8 @@
         </p:nvSpPr>
         <p:spPr>
           <a:xfrm>
-            <a:off x="838199" y="1825625"/>
-            <a:ext cx="11057314" cy="3353204"/>
+            <a:off x="838197" y="1825624"/>
+            <a:ext cx="6514707" cy="4782565"/>
           </a:xfrm>
         </p:spPr>
         <p:txBody>
@@ -4928,69 +4938,155 @@
           </a:bodyPr>
           <a:lstStyle/>
           <a:p>
-            <a:r>
-              <a:rPr lang="en-US" sz="2300" dirty="0"/>
-              <a:t>Received and addressed comments from SPRING, OPSAWG and other network operators.</a:t>
-            </a:r>
-          </a:p>
-          <a:p>
-            <a:r>
-              <a:rPr lang="en-US" sz="2300" dirty="0"/>
-              <a:t>Added "Compressed SRv6 Segment List Decomposition" in operational consideration section</a:t>
-            </a:r>
-            <a:endParaRPr lang="en-US" sz="2300" b="1" dirty="0"/>
-          </a:p>
-          <a:p>
-            <a:r>
-              <a:rPr lang="en-US" sz="2300" b="1" dirty="0" err="1"/>
+            <a:pPr>
+              <a:spcBef>
+                <a:spcPts val="600"/>
+              </a:spcBef>
+            </a:pPr>
+            <a:r>
+              <a:rPr lang="en-US" sz="1700" b="1" dirty="0"/>
+              <a:t>srhSegmentIPv6sLeft</a:t>
+            </a:r>
+          </a:p>
+          <a:p>
+            <a:pPr marL="457200" lvl="1" indent="0">
+              <a:spcBef>
+                <a:spcPts val="600"/>
+              </a:spcBef>
+              <a:buNone/>
+            </a:pPr>
+            <a:r>
+              <a:rPr lang="en-US" sz="1700" dirty="0"/>
+              <a:t>8-bit unsigned integer defining the number of route segments remaining to reach the end of the segment list.</a:t>
+            </a:r>
+            <a:endParaRPr lang="en-US" sz="1700" b="1" dirty="0"/>
+          </a:p>
+          <a:p>
+            <a:pPr>
+              <a:spcBef>
+                <a:spcPts val="600"/>
+              </a:spcBef>
+            </a:pPr>
+            <a:r>
+              <a:rPr lang="en-US" sz="1700" b="1" dirty="0"/>
+              <a:t>srhTagIPv6</a:t>
+            </a:r>
+          </a:p>
+          <a:p>
+            <a:pPr marL="457200" lvl="1" indent="0">
+              <a:spcBef>
+                <a:spcPts val="600"/>
+              </a:spcBef>
+              <a:buNone/>
+            </a:pPr>
+            <a:r>
+              <a:rPr lang="en-US" sz="1700" dirty="0"/>
+              <a:t>16-bit tag field defined in the SRH that marks a packet as part of a class or group of packets sharing the same set of properties.</a:t>
+            </a:r>
+          </a:p>
+          <a:p>
+            <a:pPr>
+              <a:spcBef>
+                <a:spcPts val="600"/>
+              </a:spcBef>
+            </a:pPr>
+            <a:r>
+              <a:rPr lang="en-US" sz="1700" b="1" dirty="0"/>
+              <a:t>srhFlagsIPv6</a:t>
+            </a:r>
+          </a:p>
+          <a:p>
+            <a:pPr marL="457200" lvl="1" indent="0">
+              <a:spcBef>
+                <a:spcPts val="600"/>
+              </a:spcBef>
+              <a:buNone/>
+            </a:pPr>
+            <a:r>
+              <a:rPr lang="en-US" sz="1700" dirty="0"/>
+              <a:t>8-bit flags defined in the SRH.</a:t>
+            </a:r>
+          </a:p>
+          <a:p>
+            <a:pPr>
+              <a:spcBef>
+                <a:spcPts val="600"/>
+              </a:spcBef>
+            </a:pPr>
+            <a:r>
+              <a:rPr lang="en-US" sz="1700" b="1" dirty="0"/>
+              <a:t>srhActiveSegmentIPv6Type</a:t>
+            </a:r>
+          </a:p>
+          <a:p>
+            <a:pPr marL="457200" lvl="1" indent="0">
+              <a:spcBef>
+                <a:spcPts val="600"/>
+              </a:spcBef>
+              <a:buNone/>
+            </a:pPr>
+            <a:r>
+              <a:rPr lang="en-US" sz="1700" dirty="0"/>
+              <a:t>Name of the routing protocol or PCEP extension from where the active SRv6 segment has been learned from.</a:t>
+            </a:r>
+          </a:p>
+          <a:p>
+            <a:pPr>
+              <a:spcBef>
+                <a:spcPts val="600"/>
+              </a:spcBef>
+            </a:pPr>
+            <a:r>
+              <a:rPr lang="en-US" sz="1700" b="1" dirty="0" err="1"/>
               <a:t>srhSegmentLocatorLength</a:t>
             </a:r>
-            <a:r>
-              <a:rPr lang="en-US" sz="2300" dirty="0"/>
-              <a:t> and </a:t>
-            </a:r>
-            <a:r>
-              <a:rPr lang="en-US" sz="2300" b="1" dirty="0" err="1"/>
+            <a:endParaRPr lang="en-US" sz="1700" b="1" dirty="0"/>
+          </a:p>
+          <a:p>
+            <a:pPr marL="457200" lvl="1" indent="0">
+              <a:spcBef>
+                <a:spcPts val="600"/>
+              </a:spcBef>
+              <a:buNone/>
+            </a:pPr>
+            <a:r>
+              <a:rPr lang="en-US" sz="1700" dirty="0"/>
+              <a:t>The number of significant bits.  Together with srhSegmentIPv6 it enables the calculation of the SRv6 Locator. </a:t>
+            </a:r>
+          </a:p>
+          <a:p>
+            <a:pPr marL="228600" lvl="1">
+              <a:spcBef>
+                <a:spcPts val="600"/>
+              </a:spcBef>
+            </a:pPr>
+            <a:r>
+              <a:rPr lang="en-US" sz="1700" b="1" dirty="0" err="1"/>
               <a:t>srhSegmentEndpointBehavior</a:t>
             </a:r>
-            <a:r>
-              <a:rPr lang="en-US" sz="2300" dirty="0"/>
-              <a:t> has been added and included in the use case and operational section description</a:t>
-            </a:r>
-          </a:p>
-          <a:p>
-            <a:r>
-              <a:rPr lang="en-US" sz="2300" dirty="0"/>
-              <a:t>Aligned IE naming according to </a:t>
-            </a:r>
-            <a:r>
-              <a:rPr lang="en-US" sz="2300" dirty="0">
-                <a:hlinkClick r:id="rId2"/>
-              </a:rPr>
-              <a:t>https://datatracker.ietf.org/doc/html/rfc7012#section-2.3</a:t>
-            </a:r>
-            <a:endParaRPr lang="en-US" sz="2300" dirty="0"/>
-          </a:p>
-          <a:p>
-            <a:r>
-              <a:rPr lang="en-US" sz="2300" dirty="0"/>
-              <a:t>Updated srhFlagsIPv6 registry</a:t>
-            </a:r>
-          </a:p>
-          <a:p>
-            <a:r>
-              <a:rPr lang="en-US" sz="2300" dirty="0"/>
-              <a:t>Added data-template and data-record examples for srhSegmentIPv6ListSection and srhSectionIPv6 in example section</a:t>
-            </a:r>
-          </a:p>
-        </p:txBody>
-      </p:sp>
-      <p:sp>
-        <p:nvSpPr>
-          <p:cNvPr id="6" name="Slide Number Placeholder 1">
-            <a:extLst>
-              <a:ext uri="{FF2B5EF4-FFF2-40B4-BE49-F238E27FC236}">
-                <a16:creationId xmlns:a16="http://schemas.microsoft.com/office/drawing/2014/main" id="{F0EC51CE-09A9-4E4B-B5C0-99570D63CA28}"/>
+            <a:endParaRPr lang="en-US" sz="1700" b="1" dirty="0"/>
+          </a:p>
+          <a:p>
+            <a:pPr marL="457200" lvl="1" indent="0">
+              <a:spcBef>
+                <a:spcPts val="600"/>
+              </a:spcBef>
+              <a:buNone/>
+            </a:pPr>
+            <a:r>
+              <a:rPr lang="en-US" sz="1700" dirty="0"/>
+              <a:t>16-bit unsigned integer that represents a SRv6 Endpoint behavior.</a:t>
+            </a:r>
+            <a:endParaRPr lang="en-US" sz="1700" b="1" dirty="0"/>
+          </a:p>
+        </p:txBody>
+      </p:sp>
+      <p:sp>
+        <p:nvSpPr>
+          <p:cNvPr id="16" name="Slide Number Placeholder 1">
+            <a:extLst>
+              <a:ext uri="{FF2B5EF4-FFF2-40B4-BE49-F238E27FC236}">
+                <a16:creationId xmlns:a16="http://schemas.microsoft.com/office/drawing/2014/main" id="{4D0044F8-1C12-4A59-883A-7B56B9370029}"/>
               </a:ext>
             </a:extLst>
           </p:cNvPr>
@@ -5015,14 +5111,384 @@
               <a:rPr lang="en-US" sz="2200" smtClean="0"/>
               <a:t>2</a:t>
             </a:fld>
-            <a:endParaRPr lang="en-US" sz="2200" dirty="0"/>
+            <a:endParaRPr lang="en-US" sz="2200"/>
+          </a:p>
+        </p:txBody>
+      </p:sp>
+      <p:pic>
+        <p:nvPicPr>
+          <p:cNvPr id="5" name="Picture 4">
+            <a:extLst>
+              <a:ext uri="{FF2B5EF4-FFF2-40B4-BE49-F238E27FC236}">
+                <a16:creationId xmlns:a16="http://schemas.microsoft.com/office/drawing/2014/main" id="{67CD09BA-31F9-4532-A75C-15EF4C785C31}"/>
+              </a:ext>
+            </a:extLst>
+          </p:cNvPr>
+          <p:cNvPicPr>
+            <a:picLocks noChangeAspect="1"/>
+          </p:cNvPicPr>
+          <p:nvPr/>
+        </p:nvPicPr>
+        <p:blipFill>
+          <a:blip r:embed="rId2"/>
+          <a:stretch>
+            <a:fillRect/>
+          </a:stretch>
+        </p:blipFill>
+        <p:spPr>
+          <a:xfrm>
+            <a:off x="7385615" y="1870471"/>
+            <a:ext cx="4591640" cy="4577534"/>
+          </a:xfrm>
+          <a:prstGeom prst="rect">
+            <a:avLst/>
+          </a:prstGeom>
+        </p:spPr>
+      </p:pic>
+      <p:sp>
+        <p:nvSpPr>
+          <p:cNvPr id="10" name="Rectangle 9">
+            <a:extLst>
+              <a:ext uri="{FF2B5EF4-FFF2-40B4-BE49-F238E27FC236}">
+                <a16:creationId xmlns:a16="http://schemas.microsoft.com/office/drawing/2014/main" id="{8F625ECD-D3E3-440D-B425-0B3432C16578}"/>
+              </a:ext>
+            </a:extLst>
+          </p:cNvPr>
+          <p:cNvSpPr/>
+          <p:nvPr/>
+        </p:nvSpPr>
+        <p:spPr>
+          <a:xfrm>
+            <a:off x="8890758" y="3919239"/>
+            <a:ext cx="914401" cy="226243"/>
+          </a:xfrm>
+          <a:prstGeom prst="rect">
+            <a:avLst/>
+          </a:prstGeom>
+          <a:noFill/>
+          <a:ln w="25400">
+            <a:solidFill>
+              <a:schemeClr val="accent6"/>
+            </a:solidFill>
+          </a:ln>
+        </p:spPr>
+        <p:style>
+          <a:lnRef idx="2">
+            <a:schemeClr val="accent1">
+              <a:shade val="50000"/>
+            </a:schemeClr>
+          </a:lnRef>
+          <a:fillRef idx="1">
+            <a:schemeClr val="accent1"/>
+          </a:fillRef>
+          <a:effectRef idx="0">
+            <a:schemeClr val="accent1"/>
+          </a:effectRef>
+          <a:fontRef idx="minor">
+            <a:schemeClr val="lt1"/>
+          </a:fontRef>
+        </p:style>
+        <p:txBody>
+          <a:bodyPr rtlCol="0" anchor="ctr"/>
+          <a:lstStyle/>
+          <a:p>
+            <a:pPr algn="ctr"/>
+            <a:endParaRPr lang="en-US"/>
+          </a:p>
+        </p:txBody>
+      </p:sp>
+      <p:cxnSp>
+        <p:nvCxnSpPr>
+          <p:cNvPr id="12" name="Straight Connector 11">
+            <a:extLst>
+              <a:ext uri="{FF2B5EF4-FFF2-40B4-BE49-F238E27FC236}">
+                <a16:creationId xmlns:a16="http://schemas.microsoft.com/office/drawing/2014/main" id="{3927FFDC-F759-434D-B3B9-9F996178A9F5}"/>
+              </a:ext>
+            </a:extLst>
+          </p:cNvPr>
+          <p:cNvCxnSpPr>
+            <a:cxnSpLocks/>
+            <a:endCxn id="10" idx="1"/>
+          </p:cNvCxnSpPr>
+          <p:nvPr/>
+        </p:nvCxnSpPr>
+        <p:spPr>
+          <a:xfrm flipV="1">
+            <a:off x="6977118" y="4032361"/>
+            <a:ext cx="1913640" cy="113121"/>
+          </a:xfrm>
+          <a:prstGeom prst="line">
+            <a:avLst/>
+          </a:prstGeom>
+          <a:ln w="25400">
+            <a:solidFill>
+              <a:schemeClr val="accent6"/>
+            </a:solidFill>
+          </a:ln>
+        </p:spPr>
+        <p:style>
+          <a:lnRef idx="1">
+            <a:schemeClr val="accent1"/>
+          </a:lnRef>
+          <a:fillRef idx="0">
+            <a:schemeClr val="accent1"/>
+          </a:fillRef>
+          <a:effectRef idx="0">
+            <a:schemeClr val="accent1"/>
+          </a:effectRef>
+          <a:fontRef idx="minor">
+            <a:schemeClr val="tx1"/>
+          </a:fontRef>
+        </p:style>
+      </p:cxnSp>
+      <p:sp>
+        <p:nvSpPr>
+          <p:cNvPr id="17" name="Rectangle 16">
+            <a:extLst>
+              <a:ext uri="{FF2B5EF4-FFF2-40B4-BE49-F238E27FC236}">
+                <a16:creationId xmlns:a16="http://schemas.microsoft.com/office/drawing/2014/main" id="{C9DE204E-31B9-4AB3-9B73-D5590C09D7EB}"/>
+              </a:ext>
+            </a:extLst>
+          </p:cNvPr>
+          <p:cNvSpPr/>
+          <p:nvPr/>
+        </p:nvSpPr>
+        <p:spPr>
+          <a:xfrm>
+            <a:off x="9805159" y="3919239"/>
+            <a:ext cx="1809947" cy="226243"/>
+          </a:xfrm>
+          <a:prstGeom prst="rect">
+            <a:avLst/>
+          </a:prstGeom>
+          <a:noFill/>
+          <a:ln w="25400">
+            <a:solidFill>
+              <a:schemeClr val="accent6"/>
+            </a:solidFill>
+          </a:ln>
+        </p:spPr>
+        <p:style>
+          <a:lnRef idx="2">
+            <a:schemeClr val="accent1">
+              <a:shade val="50000"/>
+            </a:schemeClr>
+          </a:lnRef>
+          <a:fillRef idx="1">
+            <a:schemeClr val="accent1"/>
+          </a:fillRef>
+          <a:effectRef idx="0">
+            <a:schemeClr val="accent1"/>
+          </a:effectRef>
+          <a:fontRef idx="minor">
+            <a:schemeClr val="lt1"/>
+          </a:fontRef>
+        </p:style>
+        <p:txBody>
+          <a:bodyPr rtlCol="0" anchor="ctr"/>
+          <a:lstStyle/>
+          <a:p>
+            <a:pPr algn="ctr"/>
+            <a:endParaRPr lang="en-US"/>
+          </a:p>
+        </p:txBody>
+      </p:sp>
+      <p:cxnSp>
+        <p:nvCxnSpPr>
+          <p:cNvPr id="18" name="Straight Connector 17">
+            <a:extLst>
+              <a:ext uri="{FF2B5EF4-FFF2-40B4-BE49-F238E27FC236}">
+                <a16:creationId xmlns:a16="http://schemas.microsoft.com/office/drawing/2014/main" id="{1C600878-53DA-4131-870D-30D7E067886F}"/>
+              </a:ext>
+            </a:extLst>
+          </p:cNvPr>
+          <p:cNvCxnSpPr>
+            <a:cxnSpLocks/>
+            <a:endCxn id="17" idx="1"/>
+          </p:cNvCxnSpPr>
+          <p:nvPr/>
+        </p:nvCxnSpPr>
+        <p:spPr>
+          <a:xfrm>
+            <a:off x="7352904" y="3416533"/>
+            <a:ext cx="2452255" cy="615828"/>
+          </a:xfrm>
+          <a:prstGeom prst="line">
+            <a:avLst/>
+          </a:prstGeom>
+          <a:ln w="25400">
+            <a:solidFill>
+              <a:schemeClr val="accent6"/>
+            </a:solidFill>
+          </a:ln>
+        </p:spPr>
+        <p:style>
+          <a:lnRef idx="1">
+            <a:schemeClr val="accent1"/>
+          </a:lnRef>
+          <a:fillRef idx="0">
+            <a:schemeClr val="accent1"/>
+          </a:fillRef>
+          <a:effectRef idx="0">
+            <a:schemeClr val="accent1"/>
+          </a:effectRef>
+          <a:fontRef idx="minor">
+            <a:schemeClr val="tx1"/>
+          </a:fontRef>
+        </p:style>
+      </p:cxnSp>
+      <p:sp>
+        <p:nvSpPr>
+          <p:cNvPr id="20" name="Rectangle 19">
+            <a:extLst>
+              <a:ext uri="{FF2B5EF4-FFF2-40B4-BE49-F238E27FC236}">
+                <a16:creationId xmlns:a16="http://schemas.microsoft.com/office/drawing/2014/main" id="{0CA7C70F-43B7-4438-AF06-A7D00E3B0246}"/>
+              </a:ext>
+            </a:extLst>
+          </p:cNvPr>
+          <p:cNvSpPr/>
+          <p:nvPr/>
+        </p:nvSpPr>
+        <p:spPr>
+          <a:xfrm>
+            <a:off x="10700705" y="3694567"/>
+            <a:ext cx="914401" cy="226243"/>
+          </a:xfrm>
+          <a:prstGeom prst="rect">
+            <a:avLst/>
+          </a:prstGeom>
+          <a:noFill/>
+          <a:ln w="25400">
+            <a:solidFill>
+              <a:schemeClr val="accent6"/>
+            </a:solidFill>
+          </a:ln>
+        </p:spPr>
+        <p:style>
+          <a:lnRef idx="2">
+            <a:schemeClr val="accent1">
+              <a:shade val="50000"/>
+            </a:schemeClr>
+          </a:lnRef>
+          <a:fillRef idx="1">
+            <a:schemeClr val="accent1"/>
+          </a:fillRef>
+          <a:effectRef idx="0">
+            <a:schemeClr val="accent1"/>
+          </a:effectRef>
+          <a:fontRef idx="minor">
+            <a:schemeClr val="lt1"/>
+          </a:fontRef>
+        </p:style>
+        <p:txBody>
+          <a:bodyPr rtlCol="0" anchor="ctr"/>
+          <a:lstStyle/>
+          <a:p>
+            <a:pPr algn="ctr"/>
+            <a:endParaRPr lang="en-US"/>
+          </a:p>
+        </p:txBody>
+      </p:sp>
+      <p:cxnSp>
+        <p:nvCxnSpPr>
+          <p:cNvPr id="22" name="Straight Connector 21">
+            <a:extLst>
+              <a:ext uri="{FF2B5EF4-FFF2-40B4-BE49-F238E27FC236}">
+                <a16:creationId xmlns:a16="http://schemas.microsoft.com/office/drawing/2014/main" id="{F84EE2C9-C014-4FB4-868A-D1FCE3466EF4}"/>
+              </a:ext>
+            </a:extLst>
+          </p:cNvPr>
+          <p:cNvCxnSpPr>
+            <a:cxnSpLocks/>
+            <a:endCxn id="20" idx="1"/>
+          </p:cNvCxnSpPr>
+          <p:nvPr/>
+        </p:nvCxnSpPr>
+        <p:spPr>
+          <a:xfrm>
+            <a:off x="7175082" y="2618340"/>
+            <a:ext cx="3525623" cy="1189349"/>
+          </a:xfrm>
+          <a:prstGeom prst="line">
+            <a:avLst/>
+          </a:prstGeom>
+          <a:ln w="25400">
+            <a:solidFill>
+              <a:schemeClr val="accent6"/>
+            </a:solidFill>
+          </a:ln>
+        </p:spPr>
+        <p:style>
+          <a:lnRef idx="1">
+            <a:schemeClr val="accent1"/>
+          </a:lnRef>
+          <a:fillRef idx="0">
+            <a:schemeClr val="accent1"/>
+          </a:fillRef>
+          <a:effectRef idx="0">
+            <a:schemeClr val="accent1"/>
+          </a:effectRef>
+          <a:fontRef idx="minor">
+            <a:schemeClr val="tx1"/>
+          </a:fontRef>
+        </p:style>
+      </p:cxnSp>
+      <p:sp>
+        <p:nvSpPr>
+          <p:cNvPr id="29" name="Rectangle 28">
+            <a:extLst>
+              <a:ext uri="{FF2B5EF4-FFF2-40B4-BE49-F238E27FC236}">
+                <a16:creationId xmlns:a16="http://schemas.microsoft.com/office/drawing/2014/main" id="{0D2715EC-290E-414B-820A-71C5FE2EC40D}"/>
+              </a:ext>
+            </a:extLst>
+          </p:cNvPr>
+          <p:cNvSpPr/>
+          <p:nvPr/>
+        </p:nvSpPr>
+        <p:spPr>
+          <a:xfrm>
+            <a:off x="7985784" y="4135704"/>
+            <a:ext cx="3629322" cy="1720753"/>
+          </a:xfrm>
+          <a:prstGeom prst="rect">
+            <a:avLst/>
+          </a:prstGeom>
+          <a:noFill/>
+          <a:ln w="25400">
+            <a:solidFill>
+              <a:schemeClr val="accent6"/>
+            </a:solidFill>
+          </a:ln>
+        </p:spPr>
+        <p:style>
+          <a:lnRef idx="2">
+            <a:schemeClr val="accent1">
+              <a:shade val="50000"/>
+            </a:schemeClr>
+          </a:lnRef>
+          <a:fillRef idx="1">
+            <a:schemeClr val="accent1"/>
+          </a:fillRef>
+          <a:effectRef idx="0">
+            <a:schemeClr val="accent1"/>
+          </a:effectRef>
+          <a:fontRef idx="minor">
+            <a:schemeClr val="lt1"/>
+          </a:fontRef>
+        </p:style>
+        <p:txBody>
+          <a:bodyPr rtlCol="0" anchor="ctr"/>
+          <a:lstStyle/>
+          <a:p>
+            <a:pPr algn="ctr"/>
+            <a:endParaRPr lang="en-US"/>
           </a:p>
         </p:txBody>
       </p:sp>
     </p:spTree>
     <p:extLst>
       <p:ext uri="{BB962C8B-B14F-4D97-AF65-F5344CB8AC3E}">
-        <p14:creationId xmlns:p14="http://schemas.microsoft.com/office/powerpoint/2010/main" val="696618838"/>
+        <p14:creationId xmlns:p14="http://schemas.microsoft.com/office/powerpoint/2010/main" val="3255145719"/>
       </p:ext>
     </p:extLst>
   </p:cSld>
@@ -5067,6 +5533,688 @@
         </p:nvSpPr>
         <p:spPr/>
         <p:txBody>
+          <a:bodyPr/>
+          <a:lstStyle/>
+          <a:p>
+            <a:r>
+              <a:rPr lang="en-US" sz="3600" b="1" dirty="0"/>
+              <a:t>SRv6 @ IPFIX</a:t>
+            </a:r>
+            <a:br>
+              <a:rPr lang="en-US" dirty="0"/>
+            </a:br>
+            <a:r>
+              <a:rPr lang="en-US" sz="3600" dirty="0" err="1">
+                <a:solidFill>
+                  <a:schemeClr val="bg2">
+                    <a:lumMod val="75000"/>
+                  </a:schemeClr>
+                </a:solidFill>
+              </a:rPr>
+              <a:t>IPFIX</a:t>
+            </a:r>
+            <a:r>
+              <a:rPr lang="en-US" sz="3600" dirty="0">
+                <a:solidFill>
+                  <a:schemeClr val="bg2">
+                    <a:lumMod val="75000"/>
+                  </a:schemeClr>
+                </a:solidFill>
+              </a:rPr>
+              <a:t> entities in context of the SRH (2)</a:t>
+            </a:r>
+          </a:p>
+        </p:txBody>
+      </p:sp>
+      <p:sp>
+        <p:nvSpPr>
+          <p:cNvPr id="3" name="Content Placeholder 2">
+            <a:extLst>
+              <a:ext uri="{FF2B5EF4-FFF2-40B4-BE49-F238E27FC236}">
+                <a16:creationId xmlns:a16="http://schemas.microsoft.com/office/drawing/2014/main" id="{29C0DFD4-432D-4B0C-93DF-790441DCF5B9}"/>
+              </a:ext>
+            </a:extLst>
+          </p:cNvPr>
+          <p:cNvSpPr>
+            <a:spLocks noGrp="1"/>
+          </p:cNvSpPr>
+          <p:nvPr>
+            <p:ph idx="1"/>
+          </p:nvPr>
+        </p:nvSpPr>
+        <p:spPr>
+          <a:xfrm>
+            <a:off x="838200" y="1825625"/>
+            <a:ext cx="5562600" cy="4351338"/>
+          </a:xfrm>
+        </p:spPr>
+        <p:txBody>
+          <a:bodyPr>
+            <a:normAutofit lnSpcReduction="10000"/>
+          </a:bodyPr>
+          <a:lstStyle/>
+          <a:p>
+            <a:pPr marL="228600" lvl="1">
+              <a:spcBef>
+                <a:spcPts val="600"/>
+              </a:spcBef>
+            </a:pPr>
+            <a:r>
+              <a:rPr lang="en-US" sz="1700" b="1" dirty="0"/>
+              <a:t>srhSectionIPv6</a:t>
+            </a:r>
+          </a:p>
+          <a:p>
+            <a:pPr marL="457200" lvl="1" indent="0">
+              <a:spcBef>
+                <a:spcPts val="600"/>
+              </a:spcBef>
+              <a:buNone/>
+            </a:pPr>
+            <a:r>
+              <a:rPr lang="en-US" sz="1700" dirty="0"/>
+              <a:t>Exposes the SRH and its TLV's as defined in section 2 of [RFC8754] as series of n octets.</a:t>
+            </a:r>
+          </a:p>
+          <a:p>
+            <a:pPr>
+              <a:spcBef>
+                <a:spcPts val="600"/>
+              </a:spcBef>
+            </a:pPr>
+            <a:r>
+              <a:rPr lang="en-US" sz="1700" b="1" dirty="0"/>
+              <a:t>srhSegmentIPv6ListSection</a:t>
+            </a:r>
+          </a:p>
+          <a:p>
+            <a:pPr marL="457200" lvl="1" indent="0">
+              <a:spcBef>
+                <a:spcPts val="600"/>
+              </a:spcBef>
+              <a:buNone/>
+            </a:pPr>
+            <a:r>
+              <a:rPr lang="en-US" sz="1700" dirty="0"/>
+              <a:t>Exposes the SRH Segment List as defined in section 2 of [RFC8754] as series of n octets.</a:t>
+            </a:r>
+          </a:p>
+          <a:p>
+            <a:pPr>
+              <a:spcBef>
+                <a:spcPts val="600"/>
+              </a:spcBef>
+            </a:pPr>
+            <a:r>
+              <a:rPr lang="en-US" sz="1700" b="1" dirty="0"/>
+              <a:t>srhSegmentIPv6</a:t>
+            </a:r>
+          </a:p>
+          <a:p>
+            <a:pPr marL="457200" lvl="1" indent="0">
+              <a:spcBef>
+                <a:spcPts val="600"/>
+              </a:spcBef>
+              <a:buNone/>
+            </a:pPr>
+            <a:r>
+              <a:rPr lang="en-US" sz="1700" dirty="0"/>
+              <a:t>128-bit IPv6 address that represents an SRv6 segment.</a:t>
+            </a:r>
+          </a:p>
+          <a:p>
+            <a:pPr>
+              <a:lnSpc>
+                <a:spcPct val="100000"/>
+              </a:lnSpc>
+              <a:spcBef>
+                <a:spcPts val="600"/>
+              </a:spcBef>
+            </a:pPr>
+            <a:r>
+              <a:rPr lang="en-US" sz="1700" b="1" dirty="0"/>
+              <a:t>srhActiveSegmentIPv6</a:t>
+            </a:r>
+          </a:p>
+          <a:p>
+            <a:pPr marL="457200" lvl="1" indent="0">
+              <a:spcBef>
+                <a:spcPts val="600"/>
+              </a:spcBef>
+              <a:buNone/>
+            </a:pPr>
+            <a:r>
+              <a:rPr lang="en-US" sz="1700" dirty="0"/>
+              <a:t>128-bit IPv6 address that represents the active SRv6 segment.</a:t>
+            </a:r>
+          </a:p>
+          <a:p>
+            <a:pPr marL="228600" lvl="1">
+              <a:spcBef>
+                <a:spcPts val="600"/>
+              </a:spcBef>
+            </a:pPr>
+            <a:r>
+              <a:rPr lang="en-US" sz="1700" b="1" dirty="0"/>
+              <a:t>srhSegmentIPv6BasicList</a:t>
+            </a:r>
+          </a:p>
+          <a:p>
+            <a:pPr marL="457200" lvl="1" indent="0">
+              <a:spcBef>
+                <a:spcPts val="600"/>
+              </a:spcBef>
+              <a:buNone/>
+            </a:pPr>
+            <a:r>
+              <a:rPr lang="en-US" sz="1700" dirty="0"/>
+              <a:t>Ordered </a:t>
+            </a:r>
+            <a:r>
+              <a:rPr lang="en-US" sz="1700" dirty="0" err="1"/>
+              <a:t>basicList</a:t>
+            </a:r>
+            <a:r>
+              <a:rPr lang="en-US" sz="1700" dirty="0"/>
+              <a:t> [RFC6313] of zero or more 128-bit IPv6 addresses in the SRH that represents the SRv6 segment list.  The Segment List is encoded starting from the active segment of the SR Policy.</a:t>
+            </a:r>
+          </a:p>
+        </p:txBody>
+      </p:sp>
+      <p:sp>
+        <p:nvSpPr>
+          <p:cNvPr id="16" name="Slide Number Placeholder 1">
+            <a:extLst>
+              <a:ext uri="{FF2B5EF4-FFF2-40B4-BE49-F238E27FC236}">
+                <a16:creationId xmlns:a16="http://schemas.microsoft.com/office/drawing/2014/main" id="{4D0044F8-1C12-4A59-883A-7B56B9370029}"/>
+              </a:ext>
+            </a:extLst>
+          </p:cNvPr>
+          <p:cNvSpPr>
+            <a:spLocks noGrp="1"/>
+          </p:cNvSpPr>
+          <p:nvPr>
+            <p:ph type="sldNum" sz="quarter" idx="12"/>
+          </p:nvPr>
+        </p:nvSpPr>
+        <p:spPr>
+          <a:xfrm>
+            <a:off x="11607800" y="6362700"/>
+            <a:ext cx="414338" cy="365125"/>
+          </a:xfrm>
+        </p:spPr>
+        <p:txBody>
+          <a:bodyPr/>
+          <a:lstStyle/>
+          <a:p>
+            <a:fld id="{FC4AC485-25DE-431E-B345-9C0A15BB7F8A}" type="slidenum">
+              <a:rPr lang="en-US" sz="2200" smtClean="0"/>
+              <a:t>3</a:t>
+            </a:fld>
+            <a:endParaRPr lang="en-US" sz="2200" dirty="0"/>
+          </a:p>
+        </p:txBody>
+      </p:sp>
+      <p:pic>
+        <p:nvPicPr>
+          <p:cNvPr id="5" name="Picture 4">
+            <a:extLst>
+              <a:ext uri="{FF2B5EF4-FFF2-40B4-BE49-F238E27FC236}">
+                <a16:creationId xmlns:a16="http://schemas.microsoft.com/office/drawing/2014/main" id="{67CD09BA-31F9-4532-A75C-15EF4C785C31}"/>
+              </a:ext>
+            </a:extLst>
+          </p:cNvPr>
+          <p:cNvPicPr>
+            <a:picLocks noChangeAspect="1"/>
+          </p:cNvPicPr>
+          <p:nvPr/>
+        </p:nvPicPr>
+        <p:blipFill>
+          <a:blip r:embed="rId2"/>
+          <a:stretch>
+            <a:fillRect/>
+          </a:stretch>
+        </p:blipFill>
+        <p:spPr>
+          <a:xfrm>
+            <a:off x="7177802" y="1812283"/>
+            <a:ext cx="4591640" cy="4577534"/>
+          </a:xfrm>
+          <a:prstGeom prst="rect">
+            <a:avLst/>
+          </a:prstGeom>
+        </p:spPr>
+      </p:pic>
+      <p:sp>
+        <p:nvSpPr>
+          <p:cNvPr id="29" name="Rectangle 28">
+            <a:extLst>
+              <a:ext uri="{FF2B5EF4-FFF2-40B4-BE49-F238E27FC236}">
+                <a16:creationId xmlns:a16="http://schemas.microsoft.com/office/drawing/2014/main" id="{0D2715EC-290E-414B-820A-71C5FE2EC40D}"/>
+              </a:ext>
+            </a:extLst>
+          </p:cNvPr>
+          <p:cNvSpPr/>
+          <p:nvPr/>
+        </p:nvSpPr>
+        <p:spPr>
+          <a:xfrm>
+            <a:off x="7777971" y="4077516"/>
+            <a:ext cx="3629322" cy="1720753"/>
+          </a:xfrm>
+          <a:prstGeom prst="rect">
+            <a:avLst/>
+          </a:prstGeom>
+          <a:noFill/>
+          <a:ln w="25400">
+            <a:solidFill>
+              <a:schemeClr val="accent6"/>
+            </a:solidFill>
+          </a:ln>
+        </p:spPr>
+        <p:style>
+          <a:lnRef idx="2">
+            <a:schemeClr val="accent1">
+              <a:shade val="50000"/>
+            </a:schemeClr>
+          </a:lnRef>
+          <a:fillRef idx="1">
+            <a:schemeClr val="accent1"/>
+          </a:fillRef>
+          <a:effectRef idx="0">
+            <a:schemeClr val="accent1"/>
+          </a:effectRef>
+          <a:fontRef idx="minor">
+            <a:schemeClr val="lt1"/>
+          </a:fontRef>
+        </p:style>
+        <p:txBody>
+          <a:bodyPr rtlCol="0" anchor="ctr"/>
+          <a:lstStyle/>
+          <a:p>
+            <a:pPr algn="ctr"/>
+            <a:endParaRPr lang="en-US"/>
+          </a:p>
+        </p:txBody>
+      </p:sp>
+      <p:cxnSp>
+        <p:nvCxnSpPr>
+          <p:cNvPr id="30" name="Straight Connector 29">
+            <a:extLst>
+              <a:ext uri="{FF2B5EF4-FFF2-40B4-BE49-F238E27FC236}">
+                <a16:creationId xmlns:a16="http://schemas.microsoft.com/office/drawing/2014/main" id="{A46E069E-BC22-4ECA-89C9-B4548CDC13DC}"/>
+              </a:ext>
+            </a:extLst>
+          </p:cNvPr>
+          <p:cNvCxnSpPr>
+            <a:cxnSpLocks/>
+          </p:cNvCxnSpPr>
+          <p:nvPr/>
+        </p:nvCxnSpPr>
+        <p:spPr>
+          <a:xfrm>
+            <a:off x="6134795" y="4305996"/>
+            <a:ext cx="1643176" cy="240070"/>
+          </a:xfrm>
+          <a:prstGeom prst="line">
+            <a:avLst/>
+          </a:prstGeom>
+          <a:ln w="25400">
+            <a:solidFill>
+              <a:schemeClr val="accent6"/>
+            </a:solidFill>
+          </a:ln>
+        </p:spPr>
+        <p:style>
+          <a:lnRef idx="1">
+            <a:schemeClr val="accent1"/>
+          </a:lnRef>
+          <a:fillRef idx="0">
+            <a:schemeClr val="accent1"/>
+          </a:fillRef>
+          <a:effectRef idx="0">
+            <a:schemeClr val="accent1"/>
+          </a:effectRef>
+          <a:fontRef idx="minor">
+            <a:schemeClr val="tx1"/>
+          </a:fontRef>
+        </p:style>
+      </p:cxnSp>
+      <p:sp>
+        <p:nvSpPr>
+          <p:cNvPr id="23" name="Rectangle 22">
+            <a:extLst>
+              <a:ext uri="{FF2B5EF4-FFF2-40B4-BE49-F238E27FC236}">
+                <a16:creationId xmlns:a16="http://schemas.microsoft.com/office/drawing/2014/main" id="{7B57C5B6-6448-4810-AF03-BE79D66E6802}"/>
+              </a:ext>
+            </a:extLst>
+          </p:cNvPr>
+          <p:cNvSpPr/>
+          <p:nvPr/>
+        </p:nvSpPr>
+        <p:spPr>
+          <a:xfrm>
+            <a:off x="7390017" y="2626825"/>
+            <a:ext cx="4272742" cy="3762991"/>
+          </a:xfrm>
+          <a:prstGeom prst="rect">
+            <a:avLst/>
+          </a:prstGeom>
+          <a:noFill/>
+          <a:ln w="25400">
+            <a:solidFill>
+              <a:schemeClr val="accent6"/>
+            </a:solidFill>
+          </a:ln>
+        </p:spPr>
+        <p:style>
+          <a:lnRef idx="2">
+            <a:schemeClr val="accent1">
+              <a:shade val="50000"/>
+            </a:schemeClr>
+          </a:lnRef>
+          <a:fillRef idx="1">
+            <a:schemeClr val="accent1"/>
+          </a:fillRef>
+          <a:effectRef idx="0">
+            <a:schemeClr val="accent1"/>
+          </a:effectRef>
+          <a:fontRef idx="minor">
+            <a:schemeClr val="lt1"/>
+          </a:fontRef>
+        </p:style>
+        <p:txBody>
+          <a:bodyPr rtlCol="0" anchor="ctr"/>
+          <a:lstStyle/>
+          <a:p>
+            <a:pPr algn="ctr"/>
+            <a:endParaRPr lang="en-US"/>
+          </a:p>
+        </p:txBody>
+      </p:sp>
+      <p:cxnSp>
+        <p:nvCxnSpPr>
+          <p:cNvPr id="24" name="Straight Connector 23">
+            <a:extLst>
+              <a:ext uri="{FF2B5EF4-FFF2-40B4-BE49-F238E27FC236}">
+                <a16:creationId xmlns:a16="http://schemas.microsoft.com/office/drawing/2014/main" id="{1EE28F0B-00CA-4B0D-BBE4-470A86C43CE3}"/>
+              </a:ext>
+            </a:extLst>
+          </p:cNvPr>
+          <p:cNvCxnSpPr>
+            <a:cxnSpLocks/>
+          </p:cNvCxnSpPr>
+          <p:nvPr/>
+        </p:nvCxnSpPr>
+        <p:spPr>
+          <a:xfrm>
+            <a:off x="5845478" y="2626825"/>
+            <a:ext cx="1544539" cy="515386"/>
+          </a:xfrm>
+          <a:prstGeom prst="line">
+            <a:avLst/>
+          </a:prstGeom>
+          <a:ln w="25400">
+            <a:solidFill>
+              <a:schemeClr val="accent6"/>
+            </a:solidFill>
+          </a:ln>
+        </p:spPr>
+        <p:style>
+          <a:lnRef idx="1">
+            <a:schemeClr val="accent1"/>
+          </a:lnRef>
+          <a:fillRef idx="0">
+            <a:schemeClr val="accent1"/>
+          </a:fillRef>
+          <a:effectRef idx="0">
+            <a:schemeClr val="accent1"/>
+          </a:effectRef>
+          <a:fontRef idx="minor">
+            <a:schemeClr val="tx1"/>
+          </a:fontRef>
+        </p:style>
+      </p:cxnSp>
+    </p:spTree>
+    <p:extLst>
+      <p:ext uri="{BB962C8B-B14F-4D97-AF65-F5344CB8AC3E}">
+        <p14:creationId xmlns:p14="http://schemas.microsoft.com/office/powerpoint/2010/main" val="2070211887"/>
+      </p:ext>
+    </p:extLst>
+  </p:cSld>
+  <p:clrMapOvr>
+    <a:masterClrMapping/>
+  </p:clrMapOvr>
+</p:sld>
+</file>
+
+<file path=ppt/slides/slide4.xml><?xml version="1.0" encoding="utf-8"?>
+<p:sld xmlns:a="http://schemas.openxmlformats.org/drawingml/2006/main" xmlns:r="http://schemas.openxmlformats.org/officeDocument/2006/relationships" xmlns:p="http://schemas.openxmlformats.org/presentationml/2006/main">
+  <p:cSld>
+    <p:spTree>
+      <p:nvGrpSpPr>
+        <p:cNvPr id="1" name=""/>
+        <p:cNvGrpSpPr/>
+        <p:nvPr/>
+      </p:nvGrpSpPr>
+      <p:grpSpPr>
+        <a:xfrm>
+          <a:off x="0" y="0"/>
+          <a:ext cx="0" cy="0"/>
+          <a:chOff x="0" y="0"/>
+          <a:chExt cx="0" cy="0"/>
+        </a:xfrm>
+      </p:grpSpPr>
+      <p:sp>
+        <p:nvSpPr>
+          <p:cNvPr id="2" name="Title 1">
+            <a:extLst>
+              <a:ext uri="{FF2B5EF4-FFF2-40B4-BE49-F238E27FC236}">
+                <a16:creationId xmlns:a16="http://schemas.microsoft.com/office/drawing/2014/main" id="{FF20F271-6F0D-4AC0-BB1D-F5C338165C13}"/>
+              </a:ext>
+            </a:extLst>
+          </p:cNvPr>
+          <p:cNvSpPr>
+            <a:spLocks noGrp="1"/>
+          </p:cNvSpPr>
+          <p:nvPr>
+            <p:ph type="title"/>
+          </p:nvPr>
+        </p:nvSpPr>
+        <p:spPr/>
+        <p:txBody>
+          <a:bodyPr>
+            <a:normAutofit/>
+          </a:bodyPr>
+          <a:lstStyle/>
+          <a:p>
+            <a:r>
+              <a:rPr lang="en-US" sz="3600" b="1"/>
+              <a:t>SRv6 @ IPFIX</a:t>
+            </a:r>
+            <a:br>
+              <a:rPr lang="en-US" sz="3600"/>
+            </a:br>
+            <a:r>
+              <a:rPr lang="en-US" sz="3600">
+                <a:solidFill>
+                  <a:schemeClr val="bg2">
+                    <a:lumMod val="75000"/>
+                  </a:schemeClr>
+                </a:solidFill>
+              </a:rPr>
+              <a:t>Draft Status</a:t>
+            </a:r>
+          </a:p>
+        </p:txBody>
+      </p:sp>
+      <p:sp>
+        <p:nvSpPr>
+          <p:cNvPr id="3" name="Content Placeholder 2">
+            <a:extLst>
+              <a:ext uri="{FF2B5EF4-FFF2-40B4-BE49-F238E27FC236}">
+                <a16:creationId xmlns:a16="http://schemas.microsoft.com/office/drawing/2014/main" id="{29C0DFD4-432D-4B0C-93DF-790441DCF5B9}"/>
+              </a:ext>
+            </a:extLst>
+          </p:cNvPr>
+          <p:cNvSpPr>
+            <a:spLocks noGrp="1"/>
+          </p:cNvSpPr>
+          <p:nvPr>
+            <p:ph idx="1"/>
+          </p:nvPr>
+        </p:nvSpPr>
+        <p:spPr>
+          <a:xfrm>
+            <a:off x="838199" y="1825625"/>
+            <a:ext cx="11057314" cy="3353204"/>
+          </a:xfrm>
+        </p:spPr>
+        <p:txBody>
+          <a:bodyPr>
+            <a:noAutofit/>
+          </a:bodyPr>
+          <a:lstStyle/>
+          <a:p>
+            <a:r>
+              <a:rPr lang="en-US" sz="2300" dirty="0"/>
+              <a:t>Received and addressed comments from SPRING, OPSAWG and other network operators.</a:t>
+            </a:r>
+          </a:p>
+          <a:p>
+            <a:r>
+              <a:rPr lang="en-US" sz="2300" dirty="0"/>
+              <a:t>Added "Compressed SRv6 Segment List Decomposition" in operational consideration section</a:t>
+            </a:r>
+            <a:endParaRPr lang="en-US" sz="2300" b="1" dirty="0"/>
+          </a:p>
+          <a:p>
+            <a:r>
+              <a:rPr lang="en-US" sz="2300" b="1" dirty="0" err="1"/>
+              <a:t>srhSegmentLocatorLength</a:t>
+            </a:r>
+            <a:r>
+              <a:rPr lang="en-US" sz="2300" dirty="0"/>
+              <a:t> and </a:t>
+            </a:r>
+            <a:r>
+              <a:rPr lang="en-US" sz="2300" b="1" dirty="0" err="1"/>
+              <a:t>srhSegmentEndpointBehavior</a:t>
+            </a:r>
+            <a:r>
+              <a:rPr lang="en-US" sz="2300" dirty="0"/>
+              <a:t> has been added and included in the use case and operational section description</a:t>
+            </a:r>
+          </a:p>
+          <a:p>
+            <a:r>
+              <a:rPr lang="en-US" sz="2300" dirty="0"/>
+              <a:t>Aligned IE naming according to </a:t>
+            </a:r>
+            <a:r>
+              <a:rPr lang="en-US" sz="2300" dirty="0">
+                <a:hlinkClick r:id="rId2"/>
+              </a:rPr>
+              <a:t>https://datatracker.ietf.org/doc/html/rfc7012#section-2.3</a:t>
+            </a:r>
+            <a:endParaRPr lang="en-US" sz="2300" dirty="0"/>
+          </a:p>
+          <a:p>
+            <a:r>
+              <a:rPr lang="en-US" sz="2300" dirty="0"/>
+              <a:t>Updated srhFlagsIPv6 registry</a:t>
+            </a:r>
+          </a:p>
+          <a:p>
+            <a:r>
+              <a:rPr lang="en-US" sz="2300" dirty="0"/>
+              <a:t>Added data-template and data-record examples for srhSegmentIPv6ListSection and srhSectionIPv6 in example section</a:t>
+            </a:r>
+          </a:p>
+        </p:txBody>
+      </p:sp>
+      <p:sp>
+        <p:nvSpPr>
+          <p:cNvPr id="6" name="Slide Number Placeholder 1">
+            <a:extLst>
+              <a:ext uri="{FF2B5EF4-FFF2-40B4-BE49-F238E27FC236}">
+                <a16:creationId xmlns:a16="http://schemas.microsoft.com/office/drawing/2014/main" id="{F0EC51CE-09A9-4E4B-B5C0-99570D63CA28}"/>
+              </a:ext>
+            </a:extLst>
+          </p:cNvPr>
+          <p:cNvSpPr>
+            <a:spLocks noGrp="1"/>
+          </p:cNvSpPr>
+          <p:nvPr>
+            <p:ph type="sldNum" sz="quarter" idx="12"/>
+          </p:nvPr>
+        </p:nvSpPr>
+        <p:spPr>
+          <a:xfrm>
+            <a:off x="11607800" y="6362700"/>
+            <a:ext cx="414338" cy="365125"/>
+          </a:xfrm>
+        </p:spPr>
+        <p:txBody>
+          <a:bodyPr/>
+          <a:lstStyle/>
+          <a:p>
+            <a:fld id="{FC4AC485-25DE-431E-B345-9C0A15BB7F8A}" type="slidenum">
+              <a:rPr lang="en-US" sz="2200" smtClean="0"/>
+              <a:t>4</a:t>
+            </a:fld>
+            <a:endParaRPr lang="en-US" sz="2200" dirty="0"/>
+          </a:p>
+        </p:txBody>
+      </p:sp>
+    </p:spTree>
+    <p:extLst>
+      <p:ext uri="{BB962C8B-B14F-4D97-AF65-F5344CB8AC3E}">
+        <p14:creationId xmlns:p14="http://schemas.microsoft.com/office/powerpoint/2010/main" val="696618838"/>
+      </p:ext>
+    </p:extLst>
+  </p:cSld>
+  <p:clrMapOvr>
+    <a:masterClrMapping/>
+  </p:clrMapOvr>
+</p:sld>
+</file>
+
+<file path=ppt/slides/slide5.xml><?xml version="1.0" encoding="utf-8"?>
+<p:sld xmlns:a="http://schemas.openxmlformats.org/drawingml/2006/main" xmlns:r="http://schemas.openxmlformats.org/officeDocument/2006/relationships" xmlns:p="http://schemas.openxmlformats.org/presentationml/2006/main">
+  <p:cSld>
+    <p:spTree>
+      <p:nvGrpSpPr>
+        <p:cNvPr id="1" name=""/>
+        <p:cNvGrpSpPr/>
+        <p:nvPr/>
+      </p:nvGrpSpPr>
+      <p:grpSpPr>
+        <a:xfrm>
+          <a:off x="0" y="0"/>
+          <a:ext cx="0" cy="0"/>
+          <a:chOff x="0" y="0"/>
+          <a:chExt cx="0" cy="0"/>
+        </a:xfrm>
+      </p:grpSpPr>
+      <p:sp>
+        <p:nvSpPr>
+          <p:cNvPr id="2" name="Title 1">
+            <a:extLst>
+              <a:ext uri="{FF2B5EF4-FFF2-40B4-BE49-F238E27FC236}">
+                <a16:creationId xmlns:a16="http://schemas.microsoft.com/office/drawing/2014/main" id="{FF20F271-6F0D-4AC0-BB1D-F5C338165C13}"/>
+              </a:ext>
+            </a:extLst>
+          </p:cNvPr>
+          <p:cNvSpPr>
+            <a:spLocks noGrp="1"/>
+          </p:cNvSpPr>
+          <p:nvPr>
+            <p:ph type="title"/>
+          </p:nvPr>
+        </p:nvSpPr>
+        <p:spPr/>
+        <p:txBody>
           <a:bodyPr>
             <a:normAutofit/>
           </a:bodyPr>
@@ -5116,31 +6264,19 @@
         </p:spPr>
         <p:txBody>
           <a:bodyPr>
-            <a:normAutofit/>
+            <a:normAutofit lnSpcReduction="10000"/>
           </a:bodyPr>
           <a:lstStyle/>
           <a:p>
             <a:r>
-              <a:rPr lang="en-US" sz="2300" dirty="0"/>
-              <a:t>Data-Plane visibility is missing in SRv6. </a:t>
-            </a:r>
-            <a:r>
               <a:rPr lang="en-US" sz="2300" b="1" dirty="0"/>
-              <a:t>Do you recognize the problem statement?</a:t>
+              <a:t>Missing SRv6 data-plane visibility is a recognized problem. </a:t>
             </a:r>
           </a:p>
           <a:p>
             <a:r>
               <a:rPr lang="en-US" sz="2300" b="1" dirty="0"/>
-              <a:t>Huawei and Cisco validated technical feasibility and working on implementations </a:t>
-            </a:r>
-            <a:r>
-              <a:rPr lang="en-US" sz="2300" dirty="0"/>
-              <a:t>which will be released in Q1/Q2 2023. 3 other network vendors </a:t>
-            </a:r>
-            <a:r>
-              <a:rPr lang="en-US" sz="2300"/>
-              <a:t>show interest.</a:t>
+              <a:t>2 vendors validated technical feasibility and working on implementations.</a:t>
             </a:r>
             <a:endParaRPr lang="en-US" sz="2300" dirty="0"/>
           </a:p>
@@ -5157,13 +6293,27 @@
           <a:p>
             <a:r>
               <a:rPr lang="en-US" sz="2300" dirty="0"/>
-              <a:t>Authors believe that document should progress quickly through IETF to avoid private enterprise code points being used in SRv6 deployments.</a:t>
-            </a:r>
-          </a:p>
-          <a:p>
+              <a:t>The authors </a:t>
+            </a:r>
             <a:r>
               <a:rPr lang="en-US" sz="2300" b="1" dirty="0"/>
-              <a:t>Call for adoption requested at OPSAWG IETF 113</a:t>
+              <a:t>addressed all open issues </a:t>
+            </a:r>
+            <a:r>
+              <a:rPr lang="en-US" sz="2300" dirty="0"/>
+              <a:t>and double-checked the IANA consideration section with the IPFIX doctors.</a:t>
+            </a:r>
+          </a:p>
+          <a:p>
+            <a:r>
+              <a:rPr lang="en-US" sz="2300" dirty="0"/>
+              <a:t>The authors believe that document should progress quickly through IETF to avoid private enterprise code points being used in SRv6 deployments.</a:t>
+            </a:r>
+          </a:p>
+          <a:p>
+            <a:r>
+              <a:rPr lang="en-US" sz="2300" b="1" dirty="0"/>
+              <a:t>The authors would like to go call for adoption (was already requested at IETF 113)</a:t>
             </a:r>
             <a:endParaRPr lang="en-US" sz="2300" dirty="0"/>
           </a:p>
@@ -5200,7 +6350,7 @@
           <a:p>
             <a:fld id="{FC4AC485-25DE-431E-B345-9C0A15BB7F8A}" type="slidenum">
               <a:rPr lang="en-US" sz="2200" smtClean="0"/>
-              <a:t>3</a:t>
+              <a:t>5</a:t>
             </a:fld>
             <a:endParaRPr lang="en-US" sz="2200" dirty="0"/>
           </a:p>

</xml_diff>

<commit_message>
merged input from Benoit
</commit_message>
<xml_diff>
--- a/draft-tgraf-opsawg-ipfix-srv6-srh-04.pptx
+++ b/draft-tgraf-opsawg-ipfix-srv6-srh-04.pptx
@@ -6078,7 +6078,17 @@
           <a:p>
             <a:r>
               <a:rPr lang="en-US" sz="2300" dirty="0"/>
-              <a:t>Received and addressed comments from SPRING, OPSAWG and other network operators.</a:t>
+              <a:t>Received comments from SPRING, OPSAWG and other network operators.</a:t>
+            </a:r>
+          </a:p>
+          <a:p>
+            <a:r>
+              <a:rPr lang="en-US" sz="2300" b="1" dirty="0"/>
+              <a:t>Addressed all open issues </a:t>
+            </a:r>
+            <a:r>
+              <a:rPr lang="en-US" sz="2300" dirty="0"/>
+              <a:t>and double-checked the IANA consideration section with the IPFIX doctors.</a:t>
             </a:r>
           </a:p>
           <a:p>
@@ -6264,7 +6274,7 @@
         </p:spPr>
         <p:txBody>
           <a:bodyPr>
-            <a:normAutofit lnSpcReduction="10000"/>
+            <a:normAutofit/>
           </a:bodyPr>
           <a:lstStyle/>
           <a:p>
@@ -6288,20 +6298,6 @@
             <a:r>
               <a:rPr lang="en-US" sz="2300" b="1" dirty="0"/>
               <a:t>Will be shown at IETF 115 hackathon.</a:t>
-            </a:r>
-          </a:p>
-          <a:p>
-            <a:r>
-              <a:rPr lang="en-US" sz="2300" dirty="0"/>
-              <a:t>The authors </a:t>
-            </a:r>
-            <a:r>
-              <a:rPr lang="en-US" sz="2300" b="1" dirty="0"/>
-              <a:t>addressed all open issues </a:t>
-            </a:r>
-            <a:r>
-              <a:rPr lang="en-US" sz="2300" dirty="0"/>
-              <a:t>and double-checked the IANA consideration section with the IPFIX doctors.</a:t>
             </a:r>
           </a:p>
           <a:p>

</xml_diff>

<commit_message>
add intro slide for 6man
</commit_message>
<xml_diff>
--- a/draft-tgraf-opsawg-ipfix-srv6-srh-04.pptx
+++ b/draft-tgraf-opsawg-ipfix-srv6-srh-04.pptx
@@ -5,14 +5,15 @@
     <p:sldMasterId id="2147483648" r:id="rId1"/>
   </p:sldMasterIdLst>
   <p:notesMasterIdLst>
-    <p:notesMasterId r:id="rId7"/>
+    <p:notesMasterId r:id="rId8"/>
   </p:notesMasterIdLst>
   <p:sldIdLst>
     <p:sldId id="1041" r:id="rId2"/>
-    <p:sldId id="1054" r:id="rId3"/>
-    <p:sldId id="1055" r:id="rId4"/>
-    <p:sldId id="1057" r:id="rId5"/>
-    <p:sldId id="1050" r:id="rId6"/>
+    <p:sldId id="1053" r:id="rId3"/>
+    <p:sldId id="1054" r:id="rId4"/>
+    <p:sldId id="1055" r:id="rId5"/>
+    <p:sldId id="1057" r:id="rId6"/>
+    <p:sldId id="1050" r:id="rId7"/>
   </p:sldIdLst>
   <p:sldSz cx="12192000" cy="6858000"/>
   <p:notesSz cx="6858000" cy="9144000"/>
@@ -926,7 +927,7 @@
           <a:p>
             <a:fld id="{E5E705E9-673F-4AC4-B29E-A7B26F3B8523}" type="datetimeFigureOut">
               <a:rPr lang="de-CH" smtClean="0"/>
-              <a:t>19.07.2022</a:t>
+              <a:t>20.07.2022</a:t>
             </a:fld>
             <a:endParaRPr lang="de-CH"/>
           </a:p>
@@ -1343,7 +1344,7 @@
           <a:p>
             <a:fld id="{9E9B238C-2335-4007-98C9-471C02CC43B6}" type="datetimeFigureOut">
               <a:rPr lang="de-CH" smtClean="0"/>
-              <a:t>19.07.2022</a:t>
+              <a:t>20.07.2022</a:t>
             </a:fld>
             <a:endParaRPr lang="de-CH"/>
           </a:p>
@@ -1543,7 +1544,7 @@
           <a:p>
             <a:fld id="{9E9B238C-2335-4007-98C9-471C02CC43B6}" type="datetimeFigureOut">
               <a:rPr lang="de-CH" smtClean="0"/>
-              <a:t>19.07.2022</a:t>
+              <a:t>20.07.2022</a:t>
             </a:fld>
             <a:endParaRPr lang="de-CH"/>
           </a:p>
@@ -1753,7 +1754,7 @@
           <a:p>
             <a:fld id="{9E9B238C-2335-4007-98C9-471C02CC43B6}" type="datetimeFigureOut">
               <a:rPr lang="de-CH" smtClean="0"/>
-              <a:t>19.07.2022</a:t>
+              <a:t>20.07.2022</a:t>
             </a:fld>
             <a:endParaRPr lang="de-CH"/>
           </a:p>
@@ -1953,7 +1954,7 @@
           <a:p>
             <a:fld id="{9E9B238C-2335-4007-98C9-471C02CC43B6}" type="datetimeFigureOut">
               <a:rPr lang="de-CH" smtClean="0"/>
-              <a:t>19.07.2022</a:t>
+              <a:t>20.07.2022</a:t>
             </a:fld>
             <a:endParaRPr lang="de-CH"/>
           </a:p>
@@ -2229,7 +2230,7 @@
           <a:p>
             <a:fld id="{9E9B238C-2335-4007-98C9-471C02CC43B6}" type="datetimeFigureOut">
               <a:rPr lang="de-CH" smtClean="0"/>
-              <a:t>19.07.2022</a:t>
+              <a:t>20.07.2022</a:t>
             </a:fld>
             <a:endParaRPr lang="de-CH"/>
           </a:p>
@@ -2497,7 +2498,7 @@
           <a:p>
             <a:fld id="{9E9B238C-2335-4007-98C9-471C02CC43B6}" type="datetimeFigureOut">
               <a:rPr lang="de-CH" smtClean="0"/>
-              <a:t>19.07.2022</a:t>
+              <a:t>20.07.2022</a:t>
             </a:fld>
             <a:endParaRPr lang="de-CH"/>
           </a:p>
@@ -2912,7 +2913,7 @@
           <a:p>
             <a:fld id="{9E9B238C-2335-4007-98C9-471C02CC43B6}" type="datetimeFigureOut">
               <a:rPr lang="de-CH" smtClean="0"/>
-              <a:t>19.07.2022</a:t>
+              <a:t>20.07.2022</a:t>
             </a:fld>
             <a:endParaRPr lang="de-CH"/>
           </a:p>
@@ -3054,7 +3055,7 @@
           <a:p>
             <a:fld id="{9E9B238C-2335-4007-98C9-471C02CC43B6}" type="datetimeFigureOut">
               <a:rPr lang="de-CH" smtClean="0"/>
-              <a:t>19.07.2022</a:t>
+              <a:t>20.07.2022</a:t>
             </a:fld>
             <a:endParaRPr lang="de-CH"/>
           </a:p>
@@ -3167,7 +3168,7 @@
           <a:p>
             <a:fld id="{9E9B238C-2335-4007-98C9-471C02CC43B6}" type="datetimeFigureOut">
               <a:rPr lang="de-CH" smtClean="0"/>
-              <a:t>19.07.2022</a:t>
+              <a:t>20.07.2022</a:t>
             </a:fld>
             <a:endParaRPr lang="de-CH"/>
           </a:p>
@@ -3480,7 +3481,7 @@
           <a:p>
             <a:fld id="{9E9B238C-2335-4007-98C9-471C02CC43B6}" type="datetimeFigureOut">
               <a:rPr lang="de-CH" smtClean="0"/>
-              <a:t>19.07.2022</a:t>
+              <a:t>20.07.2022</a:t>
             </a:fld>
             <a:endParaRPr lang="de-CH"/>
           </a:p>
@@ -3769,7 +3770,7 @@
           <a:p>
             <a:fld id="{9E9B238C-2335-4007-98C9-471C02CC43B6}" type="datetimeFigureOut">
               <a:rPr lang="de-CH" smtClean="0"/>
-              <a:t>19.07.2022</a:t>
+              <a:t>20.07.2022</a:t>
             </a:fld>
             <a:endParaRPr lang="de-CH"/>
           </a:p>
@@ -4012,7 +4013,7 @@
           <a:p>
             <a:fld id="{9E9B238C-2335-4007-98C9-471C02CC43B6}" type="datetimeFigureOut">
               <a:rPr lang="de-CH" smtClean="0"/>
-              <a:t>19.07.2022</a:t>
+              <a:t>20.07.2022</a:t>
             </a:fld>
             <a:endParaRPr lang="de-CH"/>
           </a:p>
@@ -4806,7 +4807,7 @@
               <a:rPr lang="de-CH" sz="3800" dirty="0">
                 <a:latin typeface="+mj-lt"/>
               </a:rPr>
-              <a:t>16. </a:t>
+              <a:t>20. </a:t>
             </a:r>
             <a:r>
               <a:rPr lang="de-CH" sz="3800" dirty="0" err="1">
@@ -4877,6 +4878,309 @@
         </p:nvSpPr>
         <p:spPr/>
         <p:txBody>
+          <a:bodyPr>
+            <a:normAutofit/>
+          </a:bodyPr>
+          <a:lstStyle/>
+          <a:p>
+            <a:r>
+              <a:rPr lang="en-US" sz="3600" b="1" dirty="0"/>
+              <a:t>SRv6 @ IPFIX</a:t>
+            </a:r>
+            <a:br>
+              <a:rPr lang="en-US" dirty="0"/>
+            </a:br>
+            <a:r>
+              <a:rPr lang="en-US" sz="3600" dirty="0">
+                <a:solidFill>
+                  <a:schemeClr val="bg2">
+                    <a:lumMod val="75000"/>
+                  </a:schemeClr>
+                </a:solidFill>
+              </a:rPr>
+              <a:t>Data-Plane visibility is missing in SRv6</a:t>
+            </a:r>
+          </a:p>
+        </p:txBody>
+      </p:sp>
+      <p:sp>
+        <p:nvSpPr>
+          <p:cNvPr id="3" name="Content Placeholder 2">
+            <a:extLst>
+              <a:ext uri="{FF2B5EF4-FFF2-40B4-BE49-F238E27FC236}">
+                <a16:creationId xmlns:a16="http://schemas.microsoft.com/office/drawing/2014/main" id="{29C0DFD4-432D-4B0C-93DF-790441DCF5B9}"/>
+              </a:ext>
+            </a:extLst>
+          </p:cNvPr>
+          <p:cNvSpPr>
+            <a:spLocks noGrp="1"/>
+          </p:cNvSpPr>
+          <p:nvPr>
+            <p:ph idx="1"/>
+          </p:nvPr>
+        </p:nvSpPr>
+        <p:spPr>
+          <a:xfrm>
+            <a:off x="838200" y="1825625"/>
+            <a:ext cx="4591639" cy="4351338"/>
+          </a:xfrm>
+        </p:spPr>
+        <p:txBody>
+          <a:bodyPr>
+            <a:noAutofit/>
+          </a:bodyPr>
+          <a:lstStyle/>
+          <a:p>
+            <a:r>
+              <a:rPr lang="en-US" sz="1700" dirty="0"/>
+              <a:t>SRv6 is already deployed at network operators (</a:t>
+            </a:r>
+            <a:r>
+              <a:rPr lang="en-US" sz="1700" dirty="0">
+                <a:hlinkClick r:id="rId2"/>
+              </a:rPr>
+              <a:t>draft-matsushima-spring-srv6-deployment-status</a:t>
+            </a:r>
+            <a:r>
+              <a:rPr lang="en-US" sz="1700" dirty="0"/>
+              <a:t>). If you know any other network operator which migrated from MPLS to SRv6 yet.</a:t>
+            </a:r>
+          </a:p>
+          <a:p>
+            <a:pPr marL="457200" lvl="1" indent="0">
+              <a:buNone/>
+            </a:pPr>
+            <a:r>
+              <a:rPr lang="en-US" sz="1700" b="1" dirty="0"/>
+              <a:t>-&gt; Feedback welcome</a:t>
+            </a:r>
+          </a:p>
+          <a:p>
+            <a:r>
+              <a:rPr lang="en-US" sz="1700" dirty="0"/>
+              <a:t>Data-Plane visibility is missing in SRv6. Unable to see how much traffic is being forwarded or dropped with which SID. </a:t>
+            </a:r>
+            <a:r>
+              <a:rPr lang="en-US" sz="1700" b="1" dirty="0"/>
+              <a:t>Network operators flying blind.</a:t>
+            </a:r>
+          </a:p>
+          <a:p>
+            <a:r>
+              <a:rPr lang="en-US" sz="1700" dirty="0"/>
+              <a:t>Segment Routing Header is defined in Section 2 of RFC 8754.</a:t>
+            </a:r>
+          </a:p>
+        </p:txBody>
+      </p:sp>
+      <p:sp>
+        <p:nvSpPr>
+          <p:cNvPr id="16" name="Slide Number Placeholder 1">
+            <a:extLst>
+              <a:ext uri="{FF2B5EF4-FFF2-40B4-BE49-F238E27FC236}">
+                <a16:creationId xmlns:a16="http://schemas.microsoft.com/office/drawing/2014/main" id="{4D0044F8-1C12-4A59-883A-7B56B9370029}"/>
+              </a:ext>
+            </a:extLst>
+          </p:cNvPr>
+          <p:cNvSpPr>
+            <a:spLocks noGrp="1"/>
+          </p:cNvSpPr>
+          <p:nvPr>
+            <p:ph type="sldNum" sz="quarter" idx="12"/>
+          </p:nvPr>
+        </p:nvSpPr>
+        <p:spPr>
+          <a:xfrm>
+            <a:off x="11607800" y="6362700"/>
+            <a:ext cx="414338" cy="365125"/>
+          </a:xfrm>
+        </p:spPr>
+        <p:txBody>
+          <a:bodyPr/>
+          <a:lstStyle/>
+          <a:p>
+            <a:fld id="{FC4AC485-25DE-431E-B345-9C0A15BB7F8A}" type="slidenum">
+              <a:rPr lang="en-US" sz="2200" smtClean="0"/>
+              <a:t>2</a:t>
+            </a:fld>
+            <a:endParaRPr lang="en-US" sz="2200"/>
+          </a:p>
+        </p:txBody>
+      </p:sp>
+      <p:pic>
+        <p:nvPicPr>
+          <p:cNvPr id="5" name="Picture 4">
+            <a:extLst>
+              <a:ext uri="{FF2B5EF4-FFF2-40B4-BE49-F238E27FC236}">
+                <a16:creationId xmlns:a16="http://schemas.microsoft.com/office/drawing/2014/main" id="{67CD09BA-31F9-4532-A75C-15EF4C785C31}"/>
+              </a:ext>
+            </a:extLst>
+          </p:cNvPr>
+          <p:cNvPicPr>
+            <a:picLocks noChangeAspect="1"/>
+          </p:cNvPicPr>
+          <p:nvPr/>
+        </p:nvPicPr>
+        <p:blipFill>
+          <a:blip r:embed="rId3"/>
+          <a:stretch>
+            <a:fillRect/>
+          </a:stretch>
+        </p:blipFill>
+        <p:spPr>
+          <a:xfrm>
+            <a:off x="6762163" y="1712527"/>
+            <a:ext cx="4591640" cy="4577534"/>
+          </a:xfrm>
+          <a:prstGeom prst="rect">
+            <a:avLst/>
+          </a:prstGeom>
+        </p:spPr>
+      </p:pic>
+      <p:sp>
+        <p:nvSpPr>
+          <p:cNvPr id="10" name="Rectangle 9">
+            <a:extLst>
+              <a:ext uri="{FF2B5EF4-FFF2-40B4-BE49-F238E27FC236}">
+                <a16:creationId xmlns:a16="http://schemas.microsoft.com/office/drawing/2014/main" id="{8F625ECD-D3E3-440D-B425-0B3432C16578}"/>
+              </a:ext>
+            </a:extLst>
+          </p:cNvPr>
+          <p:cNvSpPr/>
+          <p:nvPr/>
+        </p:nvSpPr>
+        <p:spPr>
+          <a:xfrm>
+            <a:off x="6974378" y="2527069"/>
+            <a:ext cx="4272742" cy="3762991"/>
+          </a:xfrm>
+          <a:prstGeom prst="rect">
+            <a:avLst/>
+          </a:prstGeom>
+          <a:noFill/>
+          <a:ln w="25400">
+            <a:solidFill>
+              <a:schemeClr val="accent6"/>
+            </a:solidFill>
+          </a:ln>
+        </p:spPr>
+        <p:style>
+          <a:lnRef idx="2">
+            <a:schemeClr val="accent1">
+              <a:shade val="50000"/>
+            </a:schemeClr>
+          </a:lnRef>
+          <a:fillRef idx="1">
+            <a:schemeClr val="accent1"/>
+          </a:fillRef>
+          <a:effectRef idx="0">
+            <a:schemeClr val="accent1"/>
+          </a:effectRef>
+          <a:fontRef idx="minor">
+            <a:schemeClr val="lt1"/>
+          </a:fontRef>
+        </p:style>
+        <p:txBody>
+          <a:bodyPr rtlCol="0" anchor="ctr"/>
+          <a:lstStyle/>
+          <a:p>
+            <a:pPr algn="ctr"/>
+            <a:endParaRPr lang="en-US"/>
+          </a:p>
+        </p:txBody>
+      </p:sp>
+      <p:cxnSp>
+        <p:nvCxnSpPr>
+          <p:cNvPr id="12" name="Straight Connector 11">
+            <a:extLst>
+              <a:ext uri="{FF2B5EF4-FFF2-40B4-BE49-F238E27FC236}">
+                <a16:creationId xmlns:a16="http://schemas.microsoft.com/office/drawing/2014/main" id="{3927FFDC-F759-434D-B3B9-9F996178A9F5}"/>
+              </a:ext>
+            </a:extLst>
+          </p:cNvPr>
+          <p:cNvCxnSpPr>
+            <a:cxnSpLocks/>
+            <a:endCxn id="10" idx="1"/>
+          </p:cNvCxnSpPr>
+          <p:nvPr/>
+        </p:nvCxnSpPr>
+        <p:spPr>
+          <a:xfrm>
+            <a:off x="5561814" y="4408565"/>
+            <a:ext cx="1412564" cy="0"/>
+          </a:xfrm>
+          <a:prstGeom prst="line">
+            <a:avLst/>
+          </a:prstGeom>
+          <a:ln w="25400">
+            <a:solidFill>
+              <a:schemeClr val="accent6"/>
+            </a:solidFill>
+          </a:ln>
+        </p:spPr>
+        <p:style>
+          <a:lnRef idx="1">
+            <a:schemeClr val="accent1"/>
+          </a:lnRef>
+          <a:fillRef idx="0">
+            <a:schemeClr val="accent1"/>
+          </a:fillRef>
+          <a:effectRef idx="0">
+            <a:schemeClr val="accent1"/>
+          </a:effectRef>
+          <a:fontRef idx="minor">
+            <a:schemeClr val="tx1"/>
+          </a:fontRef>
+        </p:style>
+      </p:cxnSp>
+    </p:spTree>
+    <p:extLst>
+      <p:ext uri="{BB962C8B-B14F-4D97-AF65-F5344CB8AC3E}">
+        <p14:creationId xmlns:p14="http://schemas.microsoft.com/office/powerpoint/2010/main" val="728278235"/>
+      </p:ext>
+    </p:extLst>
+  </p:cSld>
+  <p:clrMapOvr>
+    <a:masterClrMapping/>
+  </p:clrMapOvr>
+</p:sld>
+</file>
+
+<file path=ppt/slides/slide3.xml><?xml version="1.0" encoding="utf-8"?>
+<p:sld xmlns:a="http://schemas.openxmlformats.org/drawingml/2006/main" xmlns:r="http://schemas.openxmlformats.org/officeDocument/2006/relationships" xmlns:p="http://schemas.openxmlformats.org/presentationml/2006/main">
+  <p:cSld>
+    <p:spTree>
+      <p:nvGrpSpPr>
+        <p:cNvPr id="1" name=""/>
+        <p:cNvGrpSpPr/>
+        <p:nvPr/>
+      </p:nvGrpSpPr>
+      <p:grpSpPr>
+        <a:xfrm>
+          <a:off x="0" y="0"/>
+          <a:ext cx="0" cy="0"/>
+          <a:chOff x="0" y="0"/>
+          <a:chExt cx="0" cy="0"/>
+        </a:xfrm>
+      </p:grpSpPr>
+      <p:sp>
+        <p:nvSpPr>
+          <p:cNvPr id="2" name="Title 1">
+            <a:extLst>
+              <a:ext uri="{FF2B5EF4-FFF2-40B4-BE49-F238E27FC236}">
+                <a16:creationId xmlns:a16="http://schemas.microsoft.com/office/drawing/2014/main" id="{FF20F271-6F0D-4AC0-BB1D-F5C338165C13}"/>
+              </a:ext>
+            </a:extLst>
+          </p:cNvPr>
+          <p:cNvSpPr>
+            <a:spLocks noGrp="1"/>
+          </p:cNvSpPr>
+          <p:nvPr>
+            <p:ph type="title"/>
+          </p:nvPr>
+        </p:nvSpPr>
+        <p:spPr/>
+        <p:txBody>
           <a:bodyPr/>
           <a:lstStyle/>
           <a:p>
@@ -5109,7 +5413,7 @@
           <a:p>
             <a:fld id="{FC4AC485-25DE-431E-B345-9C0A15BB7F8A}" type="slidenum">
               <a:rPr lang="en-US" sz="2200" smtClean="0"/>
-              <a:t>2</a:t>
+              <a:t>3</a:t>
             </a:fld>
             <a:endParaRPr lang="en-US" sz="2200"/>
           </a:p>
@@ -5498,7 +5802,7 @@
 </p:sld>
 </file>
 
-<file path=ppt/slides/slide3.xml><?xml version="1.0" encoding="utf-8"?>
+<file path=ppt/slides/slide4.xml><?xml version="1.0" encoding="utf-8"?>
 <p:sld xmlns:a="http://schemas.openxmlformats.org/drawingml/2006/main" xmlns:r="http://schemas.openxmlformats.org/officeDocument/2006/relationships" xmlns:p="http://schemas.openxmlformats.org/presentationml/2006/main">
   <p:cSld>
     <p:spTree>
@@ -5749,7 +6053,7 @@
           <a:p>
             <a:fld id="{FC4AC485-25DE-431E-B345-9C0A15BB7F8A}" type="slidenum">
               <a:rPr lang="en-US" sz="2200" smtClean="0"/>
-              <a:t>3</a:t>
+              <a:t>4</a:t>
             </a:fld>
             <a:endParaRPr lang="en-US" sz="2200" dirty="0"/>
           </a:p>
@@ -5988,208 +6292,6 @@
 </p:sld>
 </file>
 
-<file path=ppt/slides/slide4.xml><?xml version="1.0" encoding="utf-8"?>
-<p:sld xmlns:a="http://schemas.openxmlformats.org/drawingml/2006/main" xmlns:r="http://schemas.openxmlformats.org/officeDocument/2006/relationships" xmlns:p="http://schemas.openxmlformats.org/presentationml/2006/main">
-  <p:cSld>
-    <p:spTree>
-      <p:nvGrpSpPr>
-        <p:cNvPr id="1" name=""/>
-        <p:cNvGrpSpPr/>
-        <p:nvPr/>
-      </p:nvGrpSpPr>
-      <p:grpSpPr>
-        <a:xfrm>
-          <a:off x="0" y="0"/>
-          <a:ext cx="0" cy="0"/>
-          <a:chOff x="0" y="0"/>
-          <a:chExt cx="0" cy="0"/>
-        </a:xfrm>
-      </p:grpSpPr>
-      <p:sp>
-        <p:nvSpPr>
-          <p:cNvPr id="2" name="Title 1">
-            <a:extLst>
-              <a:ext uri="{FF2B5EF4-FFF2-40B4-BE49-F238E27FC236}">
-                <a16:creationId xmlns:a16="http://schemas.microsoft.com/office/drawing/2014/main" id="{FF20F271-6F0D-4AC0-BB1D-F5C338165C13}"/>
-              </a:ext>
-            </a:extLst>
-          </p:cNvPr>
-          <p:cNvSpPr>
-            <a:spLocks noGrp="1"/>
-          </p:cNvSpPr>
-          <p:nvPr>
-            <p:ph type="title"/>
-          </p:nvPr>
-        </p:nvSpPr>
-        <p:spPr/>
-        <p:txBody>
-          <a:bodyPr>
-            <a:normAutofit/>
-          </a:bodyPr>
-          <a:lstStyle/>
-          <a:p>
-            <a:r>
-              <a:rPr lang="en-US" sz="3600" b="1"/>
-              <a:t>SRv6 @ IPFIX</a:t>
-            </a:r>
-            <a:br>
-              <a:rPr lang="en-US" sz="3600"/>
-            </a:br>
-            <a:r>
-              <a:rPr lang="en-US" sz="3600">
-                <a:solidFill>
-                  <a:schemeClr val="bg2">
-                    <a:lumMod val="75000"/>
-                  </a:schemeClr>
-                </a:solidFill>
-              </a:rPr>
-              <a:t>Draft Status</a:t>
-            </a:r>
-          </a:p>
-        </p:txBody>
-      </p:sp>
-      <p:sp>
-        <p:nvSpPr>
-          <p:cNvPr id="3" name="Content Placeholder 2">
-            <a:extLst>
-              <a:ext uri="{FF2B5EF4-FFF2-40B4-BE49-F238E27FC236}">
-                <a16:creationId xmlns:a16="http://schemas.microsoft.com/office/drawing/2014/main" id="{29C0DFD4-432D-4B0C-93DF-790441DCF5B9}"/>
-              </a:ext>
-            </a:extLst>
-          </p:cNvPr>
-          <p:cNvSpPr>
-            <a:spLocks noGrp="1"/>
-          </p:cNvSpPr>
-          <p:nvPr>
-            <p:ph idx="1"/>
-          </p:nvPr>
-        </p:nvSpPr>
-        <p:spPr>
-          <a:xfrm>
-            <a:off x="838199" y="1825625"/>
-            <a:ext cx="11057314" cy="3353204"/>
-          </a:xfrm>
-        </p:spPr>
-        <p:txBody>
-          <a:bodyPr>
-            <a:noAutofit/>
-          </a:bodyPr>
-          <a:lstStyle/>
-          <a:p>
-            <a:r>
-              <a:rPr lang="en-US" sz="2300" dirty="0"/>
-              <a:t>Received comments from SPRING, OPSAWG and other network operators.</a:t>
-            </a:r>
-          </a:p>
-          <a:p>
-            <a:r>
-              <a:rPr lang="en-US" sz="2300" b="1" dirty="0"/>
-              <a:t>Addressed all open issues </a:t>
-            </a:r>
-            <a:r>
-              <a:rPr lang="en-US" sz="2300" dirty="0"/>
-              <a:t>and double-checked the IANA consideration section with the IPFIX doctors.</a:t>
-            </a:r>
-          </a:p>
-          <a:p>
-            <a:r>
-              <a:rPr lang="en-US" sz="2300" dirty="0"/>
-              <a:t>Added "Compressed SRv6 Segment List Decomposition" in operational consideration section</a:t>
-            </a:r>
-            <a:endParaRPr lang="en-US" sz="2300" b="1" dirty="0"/>
-          </a:p>
-          <a:p>
-            <a:r>
-              <a:rPr lang="en-US" sz="2300" b="1" dirty="0" err="1"/>
-              <a:t>srhSegmentLocatorLength</a:t>
-            </a:r>
-            <a:r>
-              <a:rPr lang="en-US" sz="2300" dirty="0"/>
-              <a:t> and </a:t>
-            </a:r>
-            <a:r>
-              <a:rPr lang="en-US" sz="2300" b="1" dirty="0" err="1"/>
-              <a:t>srhSegmentEndpointBehavior</a:t>
-            </a:r>
-            <a:r>
-              <a:rPr lang="en-US" sz="2300" dirty="0"/>
-              <a:t> has been added and included in the use case and operational section description</a:t>
-            </a:r>
-          </a:p>
-          <a:p>
-            <a:r>
-              <a:rPr lang="en-US" sz="2300" dirty="0"/>
-              <a:t>Aligned IE naming according to </a:t>
-            </a:r>
-            <a:r>
-              <a:rPr lang="en-US" sz="2300" dirty="0">
-                <a:hlinkClick r:id="rId2"/>
-              </a:rPr>
-              <a:t>https://datatracker.ietf.org/doc/html/rfc7012#section-2.3</a:t>
-            </a:r>
-            <a:endParaRPr lang="en-US" sz="2300" dirty="0"/>
-          </a:p>
-          <a:p>
-            <a:r>
-              <a:rPr lang="en-US" sz="2300" dirty="0"/>
-              <a:t>Updated srhFlagsIPv6 registry</a:t>
-            </a:r>
-          </a:p>
-          <a:p>
-            <a:r>
-              <a:rPr lang="en-US" sz="2300" dirty="0"/>
-              <a:t>Added data-template and data-record examples for srhSegmentIPv6ListSection and srhSectionIPv6 in example section</a:t>
-            </a:r>
-          </a:p>
-        </p:txBody>
-      </p:sp>
-      <p:sp>
-        <p:nvSpPr>
-          <p:cNvPr id="6" name="Slide Number Placeholder 1">
-            <a:extLst>
-              <a:ext uri="{FF2B5EF4-FFF2-40B4-BE49-F238E27FC236}">
-                <a16:creationId xmlns:a16="http://schemas.microsoft.com/office/drawing/2014/main" id="{F0EC51CE-09A9-4E4B-B5C0-99570D63CA28}"/>
-              </a:ext>
-            </a:extLst>
-          </p:cNvPr>
-          <p:cNvSpPr>
-            <a:spLocks noGrp="1"/>
-          </p:cNvSpPr>
-          <p:nvPr>
-            <p:ph type="sldNum" sz="quarter" idx="12"/>
-          </p:nvPr>
-        </p:nvSpPr>
-        <p:spPr>
-          <a:xfrm>
-            <a:off x="11607800" y="6362700"/>
-            <a:ext cx="414338" cy="365125"/>
-          </a:xfrm>
-        </p:spPr>
-        <p:txBody>
-          <a:bodyPr/>
-          <a:lstStyle/>
-          <a:p>
-            <a:fld id="{FC4AC485-25DE-431E-B345-9C0A15BB7F8A}" type="slidenum">
-              <a:rPr lang="en-US" sz="2200" smtClean="0"/>
-              <a:t>4</a:t>
-            </a:fld>
-            <a:endParaRPr lang="en-US" sz="2200" dirty="0"/>
-          </a:p>
-        </p:txBody>
-      </p:sp>
-    </p:spTree>
-    <p:extLst>
-      <p:ext uri="{BB962C8B-B14F-4D97-AF65-F5344CB8AC3E}">
-        <p14:creationId xmlns:p14="http://schemas.microsoft.com/office/powerpoint/2010/main" val="696618838"/>
-      </p:ext>
-    </p:extLst>
-  </p:cSld>
-  <p:clrMapOvr>
-    <a:masterClrMapping/>
-  </p:clrMapOvr>
-</p:sld>
-</file>
-
 <file path=ppt/slides/slide5.xml><?xml version="1.0" encoding="utf-8"?>
 <p:sld xmlns:a="http://schemas.openxmlformats.org/drawingml/2006/main" xmlns:r="http://schemas.openxmlformats.org/officeDocument/2006/relationships" xmlns:p="http://schemas.openxmlformats.org/presentationml/2006/main">
   <p:cSld>
@@ -6231,6 +6333,208 @@
           <a:lstStyle/>
           <a:p>
             <a:r>
+              <a:rPr lang="en-US" sz="3600" b="1"/>
+              <a:t>SRv6 @ IPFIX</a:t>
+            </a:r>
+            <a:br>
+              <a:rPr lang="en-US" sz="3600"/>
+            </a:br>
+            <a:r>
+              <a:rPr lang="en-US" sz="3600">
+                <a:solidFill>
+                  <a:schemeClr val="bg2">
+                    <a:lumMod val="75000"/>
+                  </a:schemeClr>
+                </a:solidFill>
+              </a:rPr>
+              <a:t>Draft Status</a:t>
+            </a:r>
+          </a:p>
+        </p:txBody>
+      </p:sp>
+      <p:sp>
+        <p:nvSpPr>
+          <p:cNvPr id="3" name="Content Placeholder 2">
+            <a:extLst>
+              <a:ext uri="{FF2B5EF4-FFF2-40B4-BE49-F238E27FC236}">
+                <a16:creationId xmlns:a16="http://schemas.microsoft.com/office/drawing/2014/main" id="{29C0DFD4-432D-4B0C-93DF-790441DCF5B9}"/>
+              </a:ext>
+            </a:extLst>
+          </p:cNvPr>
+          <p:cNvSpPr>
+            <a:spLocks noGrp="1"/>
+          </p:cNvSpPr>
+          <p:nvPr>
+            <p:ph idx="1"/>
+          </p:nvPr>
+        </p:nvSpPr>
+        <p:spPr>
+          <a:xfrm>
+            <a:off x="838199" y="1825625"/>
+            <a:ext cx="11057314" cy="3353204"/>
+          </a:xfrm>
+        </p:spPr>
+        <p:txBody>
+          <a:bodyPr>
+            <a:noAutofit/>
+          </a:bodyPr>
+          <a:lstStyle/>
+          <a:p>
+            <a:r>
+              <a:rPr lang="en-US" sz="2300" dirty="0"/>
+              <a:t>Received comments from SPRING, OPSAWG and other network operators.</a:t>
+            </a:r>
+          </a:p>
+          <a:p>
+            <a:r>
+              <a:rPr lang="en-US" sz="2300" b="1" dirty="0"/>
+              <a:t>Addressed all open issues </a:t>
+            </a:r>
+            <a:r>
+              <a:rPr lang="en-US" sz="2300" dirty="0"/>
+              <a:t>and double-checked the IANA consideration section with the IPFIX doctors.</a:t>
+            </a:r>
+          </a:p>
+          <a:p>
+            <a:r>
+              <a:rPr lang="en-US" sz="2300" dirty="0"/>
+              <a:t>Added "Compressed SRv6 Segment List Decomposition" in operational consideration section</a:t>
+            </a:r>
+            <a:endParaRPr lang="en-US" sz="2300" b="1" dirty="0"/>
+          </a:p>
+          <a:p>
+            <a:r>
+              <a:rPr lang="en-US" sz="2300" b="1" dirty="0" err="1"/>
+              <a:t>srhSegmentLocatorLength</a:t>
+            </a:r>
+            <a:r>
+              <a:rPr lang="en-US" sz="2300" dirty="0"/>
+              <a:t> and </a:t>
+            </a:r>
+            <a:r>
+              <a:rPr lang="en-US" sz="2300" b="1" dirty="0" err="1"/>
+              <a:t>srhSegmentEndpointBehavior</a:t>
+            </a:r>
+            <a:r>
+              <a:rPr lang="en-US" sz="2300" dirty="0"/>
+              <a:t> has been added and included in the use case and operational section description</a:t>
+            </a:r>
+          </a:p>
+          <a:p>
+            <a:r>
+              <a:rPr lang="en-US" sz="2300" dirty="0"/>
+              <a:t>Aligned IE naming according to </a:t>
+            </a:r>
+            <a:r>
+              <a:rPr lang="en-US" sz="2300" dirty="0">
+                <a:hlinkClick r:id="rId2"/>
+              </a:rPr>
+              <a:t>https://datatracker.ietf.org/doc/html/rfc7012#section-2.3</a:t>
+            </a:r>
+            <a:endParaRPr lang="en-US" sz="2300" dirty="0"/>
+          </a:p>
+          <a:p>
+            <a:r>
+              <a:rPr lang="en-US" sz="2300" dirty="0"/>
+              <a:t>Updated srhFlagsIPv6 registry</a:t>
+            </a:r>
+          </a:p>
+          <a:p>
+            <a:r>
+              <a:rPr lang="en-US" sz="2300" dirty="0"/>
+              <a:t>Added data-template and data-record examples for srhSegmentIPv6ListSection and srhSectionIPv6 in example section</a:t>
+            </a:r>
+          </a:p>
+        </p:txBody>
+      </p:sp>
+      <p:sp>
+        <p:nvSpPr>
+          <p:cNvPr id="6" name="Slide Number Placeholder 1">
+            <a:extLst>
+              <a:ext uri="{FF2B5EF4-FFF2-40B4-BE49-F238E27FC236}">
+                <a16:creationId xmlns:a16="http://schemas.microsoft.com/office/drawing/2014/main" id="{F0EC51CE-09A9-4E4B-B5C0-99570D63CA28}"/>
+              </a:ext>
+            </a:extLst>
+          </p:cNvPr>
+          <p:cNvSpPr>
+            <a:spLocks noGrp="1"/>
+          </p:cNvSpPr>
+          <p:nvPr>
+            <p:ph type="sldNum" sz="quarter" idx="12"/>
+          </p:nvPr>
+        </p:nvSpPr>
+        <p:spPr>
+          <a:xfrm>
+            <a:off x="11607800" y="6362700"/>
+            <a:ext cx="414338" cy="365125"/>
+          </a:xfrm>
+        </p:spPr>
+        <p:txBody>
+          <a:bodyPr/>
+          <a:lstStyle/>
+          <a:p>
+            <a:fld id="{FC4AC485-25DE-431E-B345-9C0A15BB7F8A}" type="slidenum">
+              <a:rPr lang="en-US" sz="2200" smtClean="0"/>
+              <a:t>5</a:t>
+            </a:fld>
+            <a:endParaRPr lang="en-US" sz="2200" dirty="0"/>
+          </a:p>
+        </p:txBody>
+      </p:sp>
+    </p:spTree>
+    <p:extLst>
+      <p:ext uri="{BB962C8B-B14F-4D97-AF65-F5344CB8AC3E}">
+        <p14:creationId xmlns:p14="http://schemas.microsoft.com/office/powerpoint/2010/main" val="696618838"/>
+      </p:ext>
+    </p:extLst>
+  </p:cSld>
+  <p:clrMapOvr>
+    <a:masterClrMapping/>
+  </p:clrMapOvr>
+</p:sld>
+</file>
+
+<file path=ppt/slides/slide6.xml><?xml version="1.0" encoding="utf-8"?>
+<p:sld xmlns:a="http://schemas.openxmlformats.org/drawingml/2006/main" xmlns:r="http://schemas.openxmlformats.org/officeDocument/2006/relationships" xmlns:p="http://schemas.openxmlformats.org/presentationml/2006/main">
+  <p:cSld>
+    <p:spTree>
+      <p:nvGrpSpPr>
+        <p:cNvPr id="1" name=""/>
+        <p:cNvGrpSpPr/>
+        <p:nvPr/>
+      </p:nvGrpSpPr>
+      <p:grpSpPr>
+        <a:xfrm>
+          <a:off x="0" y="0"/>
+          <a:ext cx="0" cy="0"/>
+          <a:chOff x="0" y="0"/>
+          <a:chExt cx="0" cy="0"/>
+        </a:xfrm>
+      </p:grpSpPr>
+      <p:sp>
+        <p:nvSpPr>
+          <p:cNvPr id="2" name="Title 1">
+            <a:extLst>
+              <a:ext uri="{FF2B5EF4-FFF2-40B4-BE49-F238E27FC236}">
+                <a16:creationId xmlns:a16="http://schemas.microsoft.com/office/drawing/2014/main" id="{FF20F271-6F0D-4AC0-BB1D-F5C338165C13}"/>
+              </a:ext>
+            </a:extLst>
+          </p:cNvPr>
+          <p:cNvSpPr>
+            <a:spLocks noGrp="1"/>
+          </p:cNvSpPr>
+          <p:nvPr>
+            <p:ph type="title"/>
+          </p:nvPr>
+        </p:nvSpPr>
+        <p:spPr/>
+        <p:txBody>
+          <a:bodyPr>
+            <a:normAutofit/>
+          </a:bodyPr>
+          <a:lstStyle/>
+          <a:p>
+            <a:r>
               <a:rPr lang="en-US" sz="3600" b="1" dirty="0"/>
               <a:t>SRv6 @ IPFIX</a:t>
             </a:r>
@@ -6346,7 +6650,7 @@
           <a:p>
             <a:fld id="{FC4AC485-25DE-431E-B345-9C0A15BB7F8A}" type="slidenum">
               <a:rPr lang="en-US" sz="2200" smtClean="0"/>
-              <a:t>5</a:t>
+              <a:t>6</a:t>
             </a:fld>
             <a:endParaRPr lang="en-US" sz="2200" dirty="0"/>
           </a:p>
@@ -6607,7 +6911,7 @@
               <a:rPr lang="de-CH" sz="3800" dirty="0">
                 <a:latin typeface="+mj-lt"/>
               </a:rPr>
-              <a:t>16. </a:t>
+              <a:t>20. </a:t>
             </a:r>
             <a:r>
               <a:rPr lang="de-CH" sz="3800" dirty="0" err="1">

</xml_diff>